<commit_message>
the file of external library dependency for C++ is upgraded.
</commit_message>
<xml_diff>
--- a/sw_dev/cpp/external_library_dependency_cpp.pptx
+++ b/sw_dev/cpp/external_library_dependency_cpp.pptx
@@ -5,10 +5,10 @@
     <p:sldMasterId id="2147483648" r:id="rId1"/>
   </p:sldMasterIdLst>
   <p:notesMasterIdLst>
-    <p:notesMasterId r:id="rId36"/>
+    <p:notesMasterId r:id="rId39"/>
   </p:notesMasterIdLst>
   <p:handoutMasterIdLst>
-    <p:handoutMasterId r:id="rId37"/>
+    <p:handoutMasterId r:id="rId40"/>
   </p:handoutMasterIdLst>
   <p:sldIdLst>
     <p:sldId id="279" r:id="rId2"/>
@@ -25,26 +25,29 @@
     <p:sldId id="314" r:id="rId13"/>
     <p:sldId id="310" r:id="rId14"/>
     <p:sldId id="298" r:id="rId15"/>
-    <p:sldId id="292" r:id="rId16"/>
-    <p:sldId id="299" r:id="rId17"/>
-    <p:sldId id="301" r:id="rId18"/>
-    <p:sldId id="300" r:id="rId19"/>
-    <p:sldId id="289" r:id="rId20"/>
-    <p:sldId id="302" r:id="rId21"/>
-    <p:sldId id="315" r:id="rId22"/>
-    <p:sldId id="317" r:id="rId23"/>
-    <p:sldId id="303" r:id="rId24"/>
-    <p:sldId id="294" r:id="rId25"/>
-    <p:sldId id="295" r:id="rId26"/>
-    <p:sldId id="290" r:id="rId27"/>
-    <p:sldId id="285" r:id="rId28"/>
-    <p:sldId id="293" r:id="rId29"/>
-    <p:sldId id="304" r:id="rId30"/>
-    <p:sldId id="307" r:id="rId31"/>
-    <p:sldId id="308" r:id="rId32"/>
-    <p:sldId id="311" r:id="rId33"/>
-    <p:sldId id="312" r:id="rId34"/>
-    <p:sldId id="313" r:id="rId35"/>
+    <p:sldId id="319" r:id="rId16"/>
+    <p:sldId id="292" r:id="rId17"/>
+    <p:sldId id="299" r:id="rId18"/>
+    <p:sldId id="301" r:id="rId19"/>
+    <p:sldId id="300" r:id="rId20"/>
+    <p:sldId id="289" r:id="rId21"/>
+    <p:sldId id="302" r:id="rId22"/>
+    <p:sldId id="315" r:id="rId23"/>
+    <p:sldId id="317" r:id="rId24"/>
+    <p:sldId id="303" r:id="rId25"/>
+    <p:sldId id="294" r:id="rId26"/>
+    <p:sldId id="295" r:id="rId27"/>
+    <p:sldId id="290" r:id="rId28"/>
+    <p:sldId id="285" r:id="rId29"/>
+    <p:sldId id="293" r:id="rId30"/>
+    <p:sldId id="304" r:id="rId31"/>
+    <p:sldId id="318" r:id="rId32"/>
+    <p:sldId id="307" r:id="rId33"/>
+    <p:sldId id="308" r:id="rId34"/>
+    <p:sldId id="311" r:id="rId35"/>
+    <p:sldId id="312" r:id="rId36"/>
+    <p:sldId id="320" r:id="rId37"/>
+    <p:sldId id="313" r:id="rId38"/>
   </p:sldIdLst>
   <p:sldSz cx="9144000" cy="6858000" type="screen4x3"/>
   <p:notesSz cx="6797675" cy="9928225"/>
@@ -259,7 +262,7 @@
             <a:fld id="{7A1B90C6-478F-4020-94F7-7A365D69A3A0}" type="datetimeFigureOut">
               <a:rPr lang="ko-KR" altLang="en-US" smtClean="0"/>
               <a:pPr/>
-              <a:t>2012-02-28</a:t>
+              <a:t>2012-07-28</a:t>
             </a:fld>
             <a:endParaRPr lang="ko-KR" altLang="en-US"/>
           </a:p>
@@ -426,7 +429,7 @@
             <a:fld id="{B21C34AF-9FD1-4FB2-A2EC-FD937BF46C9F}" type="datetimeFigureOut">
               <a:rPr lang="ko-KR" altLang="en-US" smtClean="0"/>
               <a:pPr/>
-              <a:t>2012-02-28</a:t>
+              <a:t>2012-07-28</a:t>
             </a:fld>
             <a:endParaRPr lang="ko-KR" altLang="en-US"/>
           </a:p>
@@ -4117,7 +4120,7 @@
           <a:graphicData uri="http://schemas.openxmlformats.org/presentationml/2006/ole">
             <mc:AlternateContent xmlns:mc="http://schemas.openxmlformats.org/markup-compatibility/2006">
               <mc:Choice xmlns:v="urn:schemas-microsoft-com:vml" Requires="v">
-                <p:oleObj spid="_x0000_s1487" name="Image" r:id="rId15" imgW="5600000" imgH="1117460" progId="">
+                <p:oleObj spid="_x0000_s1521" name="Image" r:id="rId15" imgW="5600000" imgH="1117460" progId="">
                   <p:embed/>
                 </p:oleObj>
               </mc:Choice>
@@ -5555,7 +5558,7 @@
           <a:p>
             <a:r>
               <a:rPr lang="en-US" altLang="ko-KR" dirty="0" smtClean="0"/>
-              <a:t>GSL</a:t>
+              <a:t>Eigen</a:t>
             </a:r>
             <a:endParaRPr lang="ko-KR" altLang="en-US" dirty="0"/>
           </a:p>
@@ -5574,7 +5577,7 @@
         <p:spPr/>
         <p:txBody>
           <a:bodyPr>
-            <a:normAutofit/>
+            <a:normAutofit fontScale="92500" lnSpcReduction="10000"/>
           </a:bodyPr>
           <a:lstStyle/>
           <a:p>
@@ -5611,24 +5614,169 @@
             </a:r>
           </a:p>
           <a:p>
+            <a:pPr lvl="1"/>
+            <a:r>
+              <a:rPr lang="en-US" altLang="ko-KR" dirty="0" smtClean="0"/>
+              <a:t>FFTW, OpenGL, </a:t>
+            </a:r>
+            <a:r>
+              <a:rPr lang="en-US" altLang="ko-KR" dirty="0" err="1" smtClean="0"/>
+              <a:t>GLut</a:t>
+            </a:r>
+            <a:r>
+              <a:rPr lang="en-US" altLang="ko-KR" dirty="0" smtClean="0"/>
+              <a:t>, GLEW, {</a:t>
+            </a:r>
+            <a:r>
+              <a:rPr lang="en-US" altLang="ko-KR" dirty="0" err="1" smtClean="0"/>
+              <a:t>SuperLU</a:t>
+            </a:r>
+            <a:r>
+              <a:rPr lang="en-US" altLang="ko-KR" dirty="0" smtClean="0"/>
+              <a:t>}, </a:t>
+            </a:r>
+            <a:r>
+              <a:rPr lang="en-US" altLang="ko-KR" dirty="0" err="1" smtClean="0"/>
+              <a:t>SuiteSparse</a:t>
+            </a:r>
+            <a:r>
+              <a:rPr lang="en-US" altLang="ko-KR" dirty="0" smtClean="0"/>
+              <a:t>(CHOLMOD, </a:t>
+            </a:r>
+            <a:r>
+              <a:rPr lang="en-US" altLang="ko-KR" dirty="0" err="1" smtClean="0"/>
+              <a:t>UMFPack</a:t>
+            </a:r>
+            <a:r>
+              <a:rPr lang="en-US" altLang="ko-KR" dirty="0" smtClean="0"/>
+              <a:t>), {</a:t>
+            </a:r>
+            <a:r>
+              <a:rPr lang="en-US" altLang="ko-KR" dirty="0" err="1" smtClean="0"/>
+              <a:t>PaStiX</a:t>
+            </a:r>
+            <a:r>
+              <a:rPr lang="en-US" altLang="ko-KR" dirty="0" smtClean="0"/>
+              <a:t>}, GMP, MPFR</a:t>
+            </a:r>
+            <a:r>
+              <a:rPr lang="en-US" altLang="ko-KR" dirty="0"/>
+              <a:t>, </a:t>
+            </a:r>
+            <a:r>
+              <a:rPr lang="en-US" altLang="ko-KR" dirty="0" smtClean="0"/>
+              <a:t>{ADOL-C}, {METIS}, {SCOTCH}, {SLURM}, {</a:t>
+            </a:r>
+            <a:r>
+              <a:rPr lang="en-US" altLang="ko-KR" dirty="0" err="1" smtClean="0"/>
+              <a:t>Qt</a:t>
+            </a:r>
+            <a:r>
+              <a:rPr lang="en-US" altLang="ko-KR" dirty="0" smtClean="0"/>
+              <a:t>}, {</a:t>
+            </a:r>
+            <a:r>
+              <a:rPr lang="en-US" altLang="ko-KR" dirty="0" err="1" smtClean="0"/>
+              <a:t>GTest</a:t>
+            </a:r>
+            <a:r>
+              <a:rPr lang="en-US" altLang="ko-KR" dirty="0" smtClean="0"/>
+              <a:t>}</a:t>
+            </a:r>
+          </a:p>
+          <a:p>
             <a:r>
               <a:rPr lang="en-US" altLang="ko-KR" dirty="0" smtClean="0"/>
               <a:t>Using libraries (clients)</a:t>
             </a:r>
           </a:p>
           <a:p>
+            <a:pPr lvl="1"/>
+            <a:r>
+              <a:rPr lang="en-US" altLang="ko-KR" dirty="0" err="1" smtClean="0"/>
+              <a:t>OpenCV</a:t>
+            </a:r>
+            <a:r>
+              <a:rPr lang="en-US" altLang="ko-KR" dirty="0" smtClean="0"/>
+              <a:t>, PCL</a:t>
+            </a:r>
+          </a:p>
+          <a:p>
             <a:r>
               <a:rPr lang="en-US" altLang="ko-KR" dirty="0" smtClean="0"/>
               <a:t>Building tips</a:t>
             </a:r>
-            <a:endParaRPr lang="ko-KR" altLang="en-US" dirty="0"/>
+          </a:p>
+          <a:p>
+            <a:pPr lvl="1"/>
+            <a:r>
+              <a:rPr lang="en-US" altLang="ko-KR" dirty="0" smtClean="0">
+                <a:solidFill>
+                  <a:srgbClr val="0000FF"/>
+                </a:solidFill>
+              </a:rPr>
+              <a:t>Eigen library</a:t>
+            </a:r>
+            <a:r>
+              <a:rPr lang="ko-KR" altLang="en-US" dirty="0" smtClean="0">
+                <a:solidFill>
+                  <a:srgbClr val="0000FF"/>
+                </a:solidFill>
+              </a:rPr>
+              <a:t>는 </a:t>
+            </a:r>
+            <a:r>
+              <a:rPr lang="en-US" altLang="ko-KR" dirty="0" smtClean="0">
+                <a:solidFill>
+                  <a:srgbClr val="0000FF"/>
+                </a:solidFill>
+              </a:rPr>
+              <a:t>header file</a:t>
+            </a:r>
+            <a:r>
+              <a:rPr lang="ko-KR" altLang="en-US" dirty="0" smtClean="0">
+                <a:solidFill>
+                  <a:srgbClr val="0000FF"/>
+                </a:solidFill>
+              </a:rPr>
+              <a:t>만 있으면 되는 </a:t>
+            </a:r>
+            <a:r>
+              <a:rPr lang="en-US" altLang="ko-KR" dirty="0" smtClean="0">
+                <a:solidFill>
+                  <a:srgbClr val="0000FF"/>
+                </a:solidFill>
+              </a:rPr>
+              <a:t>library</a:t>
+            </a:r>
+            <a:r>
+              <a:rPr lang="ko-KR" altLang="en-US" dirty="0" smtClean="0">
+                <a:solidFill>
+                  <a:srgbClr val="0000FF"/>
+                </a:solidFill>
+              </a:rPr>
+              <a:t>임</a:t>
+            </a:r>
+            <a:r>
+              <a:rPr lang="en-US" altLang="ko-KR" dirty="0" smtClean="0">
+                <a:solidFill>
+                  <a:srgbClr val="0000FF"/>
+                </a:solidFill>
+              </a:rPr>
+              <a:t>.</a:t>
+            </a:r>
+            <a:endParaRPr lang="ko-KR" altLang="en-US" dirty="0">
+              <a:solidFill>
+                <a:srgbClr val="0000FF"/>
+              </a:solidFill>
+            </a:endParaRPr>
           </a:p>
         </p:txBody>
       </p:sp>
     </p:spTree>
     <p:extLst>
       <p:ext uri="{BB962C8B-B14F-4D97-AF65-F5344CB8AC3E}">
-        <p14:creationId xmlns:p14="http://schemas.microsoft.com/office/powerpoint/2010/main" val="4092563990"/>
+        <p14:creationId xmlns:p14="http://schemas.microsoft.com/office/powerpoint/2010/main" val="2678813392"/>
       </p:ext>
     </p:extLst>
   </p:cSld>
@@ -5672,7 +5820,7 @@
           <a:p>
             <a:r>
               <a:rPr lang="en-US" altLang="ko-KR" dirty="0" smtClean="0"/>
-              <a:t>GMP</a:t>
+              <a:t>GSL</a:t>
             </a:r>
             <a:endParaRPr lang="ko-KR" altLang="en-US" dirty="0"/>
           </a:p>
@@ -5704,25 +5852,15 @@
             <a:pPr lvl="1"/>
             <a:r>
               <a:rPr lang="en-US" altLang="ko-KR" dirty="0"/>
-              <a:t>Link mode: </a:t>
-            </a:r>
-            <a:r>
-              <a:rPr lang="en-US" altLang="ko-KR" dirty="0" smtClean="0"/>
-              <a:t>Shared</a:t>
-            </a:r>
-            <a:endParaRPr lang="en-US" altLang="ko-KR" dirty="0"/>
+              <a:t>Link mode: Shared / Static</a:t>
+            </a:r>
           </a:p>
           <a:p>
             <a:pPr lvl="1"/>
             <a:r>
               <a:rPr lang="en-US" altLang="ko-KR" dirty="0"/>
-              <a:t>Build mode: </a:t>
-            </a:r>
-            <a:r>
-              <a:rPr lang="en-US" altLang="ko-KR" dirty="0" smtClean="0"/>
-              <a:t>Release</a:t>
-            </a:r>
-            <a:endParaRPr lang="en-US" altLang="ko-KR" dirty="0"/>
+              <a:t>Build mode: Release / Debug</a:t>
+            </a:r>
           </a:p>
           <a:p>
             <a:pPr lvl="1"/>
@@ -5755,7 +5893,7 @@
     </p:spTree>
     <p:extLst>
       <p:ext uri="{BB962C8B-B14F-4D97-AF65-F5344CB8AC3E}">
-        <p14:creationId xmlns:p14="http://schemas.microsoft.com/office/powerpoint/2010/main" val="299578193"/>
+        <p14:creationId xmlns:p14="http://schemas.microsoft.com/office/powerpoint/2010/main" val="4092563990"/>
       </p:ext>
     </p:extLst>
   </p:cSld>
@@ -5799,7 +5937,7 @@
           <a:p>
             <a:r>
               <a:rPr lang="en-US" altLang="ko-KR" dirty="0" smtClean="0"/>
-              <a:t>MPFR</a:t>
+              <a:t>GMP</a:t>
             </a:r>
             <a:endParaRPr lang="ko-KR" altLang="en-US" dirty="0"/>
           </a:p>
@@ -5882,7 +6020,7 @@
     </p:spTree>
     <p:extLst>
       <p:ext uri="{BB962C8B-B14F-4D97-AF65-F5344CB8AC3E}">
-        <p14:creationId xmlns:p14="http://schemas.microsoft.com/office/powerpoint/2010/main" val="46825636"/>
+        <p14:creationId xmlns:p14="http://schemas.microsoft.com/office/powerpoint/2010/main" val="299578193"/>
       </p:ext>
     </p:extLst>
   </p:cSld>
@@ -5926,7 +6064,7 @@
           <a:p>
             <a:r>
               <a:rPr lang="en-US" altLang="ko-KR" dirty="0" smtClean="0"/>
-              <a:t>CUDA</a:t>
+              <a:t>MPFR</a:t>
             </a:r>
             <a:endParaRPr lang="ko-KR" altLang="en-US" dirty="0"/>
           </a:p>
@@ -5958,15 +6096,25 @@
             <a:pPr lvl="1"/>
             <a:r>
               <a:rPr lang="en-US" altLang="ko-KR" dirty="0"/>
-              <a:t>Link mode: Shared / Static</a:t>
-            </a:r>
+              <a:t>Link mode: </a:t>
+            </a:r>
+            <a:r>
+              <a:rPr lang="en-US" altLang="ko-KR" dirty="0" smtClean="0"/>
+              <a:t>Shared</a:t>
+            </a:r>
+            <a:endParaRPr lang="en-US" altLang="ko-KR" dirty="0"/>
           </a:p>
           <a:p>
             <a:pPr lvl="1"/>
             <a:r>
               <a:rPr lang="en-US" altLang="ko-KR" dirty="0"/>
-              <a:t>Build mode: Release / Debug</a:t>
-            </a:r>
+              <a:t>Build mode: </a:t>
+            </a:r>
+            <a:r>
+              <a:rPr lang="en-US" altLang="ko-KR" dirty="0" smtClean="0"/>
+              <a:t>Release</a:t>
+            </a:r>
+            <a:endParaRPr lang="en-US" altLang="ko-KR" dirty="0"/>
           </a:p>
           <a:p>
             <a:pPr lvl="1"/>
@@ -5999,7 +6147,7 @@
     </p:spTree>
     <p:extLst>
       <p:ext uri="{BB962C8B-B14F-4D97-AF65-F5344CB8AC3E}">
-        <p14:creationId xmlns:p14="http://schemas.microsoft.com/office/powerpoint/2010/main" val="913659169"/>
+        <p14:creationId xmlns:p14="http://schemas.microsoft.com/office/powerpoint/2010/main" val="46825636"/>
       </p:ext>
     </p:extLst>
   </p:cSld>
@@ -6043,7 +6191,7 @@
           <a:p>
             <a:r>
               <a:rPr lang="en-US" altLang="ko-KR" dirty="0" smtClean="0"/>
-              <a:t>Cairo</a:t>
+              <a:t>CUDA</a:t>
             </a:r>
             <a:endParaRPr lang="ko-KR" altLang="en-US" dirty="0"/>
           </a:p>
@@ -6116,7 +6264,7 @@
     </p:spTree>
     <p:extLst>
       <p:ext uri="{BB962C8B-B14F-4D97-AF65-F5344CB8AC3E}">
-        <p14:creationId xmlns:p14="http://schemas.microsoft.com/office/powerpoint/2010/main" val="2006130297"/>
+        <p14:creationId xmlns:p14="http://schemas.microsoft.com/office/powerpoint/2010/main" val="913659169"/>
       </p:ext>
     </p:extLst>
   </p:cSld>
@@ -10700,6 +10848,365 @@
           </p:txBody>
         </p:sp>
       </p:grpSp>
+      <p:grpSp>
+        <p:nvGrpSpPr>
+          <p:cNvPr id="75" name="그룹 74"/>
+          <p:cNvGrpSpPr/>
+          <p:nvPr/>
+        </p:nvGrpSpPr>
+        <p:grpSpPr>
+          <a:xfrm>
+            <a:off x="6804248" y="3714472"/>
+            <a:ext cx="1440160" cy="500701"/>
+            <a:chOff x="5076056" y="3714472"/>
+            <a:chExt cx="1440160" cy="500701"/>
+          </a:xfrm>
+        </p:grpSpPr>
+        <p:sp>
+          <p:nvSpPr>
+            <p:cNvPr id="76" name="직사각형 75"/>
+            <p:cNvSpPr/>
+            <p:nvPr/>
+          </p:nvSpPr>
+          <p:spPr bwMode="auto">
+            <a:xfrm>
+              <a:off x="5076056" y="3714472"/>
+              <a:ext cx="1440160" cy="500701"/>
+            </a:xfrm>
+            <a:prstGeom prst="rect">
+              <a:avLst/>
+            </a:prstGeom>
+            <a:noFill/>
+            <a:ln w="9525" cap="flat" cmpd="sng" algn="ctr">
+              <a:solidFill>
+                <a:schemeClr val="tx1"/>
+              </a:solidFill>
+              <a:prstDash val="solid"/>
+              <a:round/>
+              <a:headEnd type="none" w="med" len="med"/>
+              <a:tailEnd type="none" w="med" len="med"/>
+            </a:ln>
+            <a:effectLst/>
+          </p:spPr>
+          <p:txBody>
+            <a:bodyPr vert="horz" wrap="square" lIns="91440" tIns="45720" rIns="91440" bIns="45720" numCol="1" rtlCol="0" anchor="t" anchorCtr="1" compatLnSpc="1">
+              <a:prstTxWarp prst="textNoShape">
+                <a:avLst/>
+              </a:prstTxWarp>
+            </a:bodyPr>
+            <a:lstStyle/>
+            <a:p>
+              <a:pPr marL="0" marR="0" indent="0" algn="ctr" defTabSz="914400" rtl="0" eaLnBrk="1" fontAlgn="base" latinLnBrk="0" hangingPunct="1">
+                <a:lnSpc>
+                  <a:spcPct val="100000"/>
+                </a:lnSpc>
+                <a:spcBef>
+                  <a:spcPct val="0"/>
+                </a:spcBef>
+                <a:spcAft>
+                  <a:spcPct val="0"/>
+                </a:spcAft>
+                <a:buClrTx/>
+                <a:buSzTx/>
+                <a:buFontTx/>
+                <a:buNone/>
+                <a:tabLst/>
+              </a:pPr>
+              <a:r>
+                <a:rPr lang="en-US" altLang="ko-KR" dirty="0" smtClean="0"/>
+                <a:t>expat</a:t>
+              </a:r>
+              <a:endParaRPr kumimoji="0" lang="ko-KR" altLang="en-US" sz="1800" b="0" i="0" u="none" strike="noStrike" cap="none" normalizeH="0" baseline="0" dirty="0" smtClean="0">
+                <a:ln>
+                  <a:noFill/>
+                </a:ln>
+                <a:effectLst/>
+                <a:latin typeface="Arial" charset="0"/>
+              </a:endParaRPr>
+            </a:p>
+          </p:txBody>
+        </p:sp>
+        <p:sp>
+          <p:nvSpPr>
+            <p:cNvPr id="77" name="직사각형 76"/>
+            <p:cNvSpPr/>
+            <p:nvPr/>
+          </p:nvSpPr>
+          <p:spPr bwMode="auto">
+            <a:xfrm>
+              <a:off x="5076056" y="4071044"/>
+              <a:ext cx="360040" cy="144016"/>
+            </a:xfrm>
+            <a:prstGeom prst="rect">
+              <a:avLst/>
+            </a:prstGeom>
+            <a:noFill/>
+            <a:ln w="9525" cap="flat" cmpd="sng" algn="ctr">
+              <a:solidFill>
+                <a:schemeClr val="tx1"/>
+              </a:solidFill>
+              <a:prstDash val="solid"/>
+              <a:round/>
+              <a:headEnd type="none" w="med" len="med"/>
+              <a:tailEnd type="none" w="med" len="med"/>
+            </a:ln>
+            <a:effectLst/>
+          </p:spPr>
+          <p:txBody>
+            <a:bodyPr vert="horz" wrap="square" lIns="91440" tIns="45720" rIns="91440" bIns="45720" numCol="1" rtlCol="0" anchor="ctr" anchorCtr="1" compatLnSpc="1">
+              <a:prstTxWarp prst="textNoShape">
+                <a:avLst/>
+              </a:prstTxWarp>
+            </a:bodyPr>
+            <a:lstStyle/>
+            <a:p>
+              <a:pPr marL="0" marR="0" indent="0" algn="ctr" defTabSz="914400" rtl="0" eaLnBrk="1" fontAlgn="base" latinLnBrk="0" hangingPunct="1">
+                <a:lnSpc>
+                  <a:spcPct val="100000"/>
+                </a:lnSpc>
+                <a:spcBef>
+                  <a:spcPct val="0"/>
+                </a:spcBef>
+                <a:spcAft>
+                  <a:spcPct val="0"/>
+                </a:spcAft>
+                <a:buClrTx/>
+                <a:buSzTx/>
+                <a:buFontTx/>
+                <a:buNone/>
+                <a:tabLst/>
+              </a:pPr>
+              <a:r>
+                <a:rPr kumimoji="0" lang="en-US" altLang="ko-KR" sz="700" b="0" i="0" u="none" strike="noStrike" cap="none" normalizeH="0" baseline="0" dirty="0" smtClean="0">
+                  <a:ln>
+                    <a:noFill/>
+                  </a:ln>
+                  <a:effectLst/>
+                  <a:latin typeface="Arial" charset="0"/>
+                </a:rPr>
+                <a:t>SO</a:t>
+              </a:r>
+              <a:endParaRPr kumimoji="0" lang="ko-KR" altLang="en-US" sz="700" b="0" i="0" u="none" strike="noStrike" cap="none" normalizeH="0" baseline="0" dirty="0" smtClean="0">
+                <a:ln>
+                  <a:noFill/>
+                </a:ln>
+                <a:effectLst/>
+                <a:latin typeface="Arial" charset="0"/>
+              </a:endParaRPr>
+            </a:p>
+          </p:txBody>
+        </p:sp>
+        <p:sp>
+          <p:nvSpPr>
+            <p:cNvPr id="118" name="직사각형 117"/>
+            <p:cNvSpPr/>
+            <p:nvPr/>
+          </p:nvSpPr>
+          <p:spPr bwMode="auto">
+            <a:xfrm>
+              <a:off x="5796136" y="4071157"/>
+              <a:ext cx="360040" cy="144016"/>
+            </a:xfrm>
+            <a:prstGeom prst="rect">
+              <a:avLst/>
+            </a:prstGeom>
+            <a:noFill/>
+            <a:ln w="9525" cap="flat" cmpd="sng" algn="ctr">
+              <a:solidFill>
+                <a:schemeClr val="tx1"/>
+              </a:solidFill>
+              <a:prstDash val="solid"/>
+              <a:round/>
+              <a:headEnd type="none" w="med" len="med"/>
+              <a:tailEnd type="none" w="med" len="med"/>
+            </a:ln>
+            <a:effectLst/>
+          </p:spPr>
+          <p:txBody>
+            <a:bodyPr vert="horz" wrap="square" lIns="91440" tIns="45720" rIns="91440" bIns="45720" numCol="1" rtlCol="0" anchor="ctr" anchorCtr="1" compatLnSpc="1">
+              <a:prstTxWarp prst="textNoShape">
+                <a:avLst/>
+              </a:prstTxWarp>
+            </a:bodyPr>
+            <a:lstStyle/>
+            <a:p>
+              <a:pPr marL="0" marR="0" indent="0" algn="ctr" defTabSz="914400" rtl="0" eaLnBrk="1" fontAlgn="base" latinLnBrk="0" hangingPunct="1">
+                <a:lnSpc>
+                  <a:spcPct val="100000"/>
+                </a:lnSpc>
+                <a:spcBef>
+                  <a:spcPct val="0"/>
+                </a:spcBef>
+                <a:spcAft>
+                  <a:spcPct val="0"/>
+                </a:spcAft>
+                <a:buClrTx/>
+                <a:buSzTx/>
+                <a:buFontTx/>
+                <a:buNone/>
+                <a:tabLst/>
+              </a:pPr>
+              <a:r>
+                <a:rPr kumimoji="0" lang="en-US" altLang="ko-KR" sz="700" b="0" i="0" u="none" strike="noStrike" cap="none" normalizeH="0" baseline="0" dirty="0" err="1" smtClean="0">
+                  <a:ln>
+                    <a:noFill/>
+                  </a:ln>
+                  <a:effectLst/>
+                  <a:latin typeface="Arial" charset="0"/>
+                </a:rPr>
+                <a:t>Rel</a:t>
+              </a:r>
+              <a:endParaRPr kumimoji="0" lang="ko-KR" altLang="en-US" sz="700" b="0" i="0" u="none" strike="noStrike" cap="none" normalizeH="0" baseline="0" dirty="0" smtClean="0">
+                <a:ln>
+                  <a:noFill/>
+                </a:ln>
+                <a:effectLst/>
+                <a:latin typeface="Arial" charset="0"/>
+              </a:endParaRPr>
+            </a:p>
+          </p:txBody>
+        </p:sp>
+        <p:sp>
+          <p:nvSpPr>
+            <p:cNvPr id="119" name="직사각형 118"/>
+            <p:cNvSpPr/>
+            <p:nvPr/>
+          </p:nvSpPr>
+          <p:spPr bwMode="auto">
+            <a:xfrm>
+              <a:off x="5436096" y="4071157"/>
+              <a:ext cx="360040" cy="144016"/>
+            </a:xfrm>
+            <a:prstGeom prst="rect">
+              <a:avLst/>
+            </a:prstGeom>
+            <a:noFill/>
+            <a:ln w="9525" cap="flat" cmpd="sng" algn="ctr">
+              <a:solidFill>
+                <a:schemeClr val="tx1"/>
+              </a:solidFill>
+              <a:prstDash val="solid"/>
+              <a:round/>
+              <a:headEnd type="none" w="med" len="med"/>
+              <a:tailEnd type="none" w="med" len="med"/>
+            </a:ln>
+            <a:effectLst/>
+          </p:spPr>
+          <p:txBody>
+            <a:bodyPr vert="horz" wrap="square" lIns="91440" tIns="45720" rIns="91440" bIns="45720" numCol="1" rtlCol="0" anchor="ctr" anchorCtr="1" compatLnSpc="1">
+              <a:prstTxWarp prst="textNoShape">
+                <a:avLst/>
+              </a:prstTxWarp>
+            </a:bodyPr>
+            <a:lstStyle/>
+            <a:p>
+              <a:pPr marL="0" marR="0" indent="0" algn="ctr" defTabSz="914400" rtl="0" eaLnBrk="1" fontAlgn="base" latinLnBrk="0" hangingPunct="1">
+                <a:lnSpc>
+                  <a:spcPct val="100000"/>
+                </a:lnSpc>
+                <a:spcBef>
+                  <a:spcPct val="0"/>
+                </a:spcBef>
+                <a:spcAft>
+                  <a:spcPct val="0"/>
+                </a:spcAft>
+                <a:buClrTx/>
+                <a:buSzTx/>
+                <a:buFontTx/>
+                <a:buNone/>
+                <a:tabLst/>
+              </a:pPr>
+              <a:r>
+                <a:rPr kumimoji="0" lang="en-US" altLang="ko-KR" sz="700" b="0" i="0" u="none" strike="noStrike" cap="none" normalizeH="0" baseline="0" dirty="0" smtClean="0">
+                  <a:ln>
+                    <a:noFill/>
+                  </a:ln>
+                  <a:effectLst/>
+                  <a:latin typeface="Arial" charset="0"/>
+                </a:rPr>
+                <a:t>Lib</a:t>
+              </a:r>
+              <a:endParaRPr kumimoji="0" lang="ko-KR" altLang="en-US" sz="700" b="0" i="0" u="none" strike="noStrike" cap="none" normalizeH="0" baseline="0" dirty="0" smtClean="0">
+                <a:ln>
+                  <a:noFill/>
+                </a:ln>
+                <a:effectLst/>
+                <a:latin typeface="Arial" charset="0"/>
+              </a:endParaRPr>
+            </a:p>
+          </p:txBody>
+        </p:sp>
+        <p:sp>
+          <p:nvSpPr>
+            <p:cNvPr id="120" name="직사각형 119"/>
+            <p:cNvSpPr/>
+            <p:nvPr/>
+          </p:nvSpPr>
+          <p:spPr bwMode="auto">
+            <a:xfrm>
+              <a:off x="6156176" y="4071157"/>
+              <a:ext cx="360040" cy="144016"/>
+            </a:xfrm>
+            <a:prstGeom prst="rect">
+              <a:avLst/>
+            </a:prstGeom>
+            <a:noFill/>
+            <a:ln w="9525" cap="flat" cmpd="sng" algn="ctr">
+              <a:solidFill>
+                <a:schemeClr val="tx1"/>
+              </a:solidFill>
+              <a:prstDash val="solid"/>
+              <a:round/>
+              <a:headEnd type="none" w="med" len="med"/>
+              <a:tailEnd type="none" w="med" len="med"/>
+            </a:ln>
+            <a:effectLst/>
+          </p:spPr>
+          <p:txBody>
+            <a:bodyPr vert="horz" wrap="square" lIns="91440" tIns="45720" rIns="91440" bIns="45720" numCol="1" rtlCol="0" anchor="ctr" anchorCtr="1" compatLnSpc="1">
+              <a:prstTxWarp prst="textNoShape">
+                <a:avLst/>
+              </a:prstTxWarp>
+            </a:bodyPr>
+            <a:lstStyle/>
+            <a:p>
+              <a:pPr marL="0" marR="0" indent="0" algn="ctr" defTabSz="914400" rtl="0" eaLnBrk="1" fontAlgn="base" latinLnBrk="0" hangingPunct="1">
+                <a:lnSpc>
+                  <a:spcPct val="100000"/>
+                </a:lnSpc>
+                <a:spcBef>
+                  <a:spcPct val="0"/>
+                </a:spcBef>
+                <a:spcAft>
+                  <a:spcPct val="0"/>
+                </a:spcAft>
+                <a:buClrTx/>
+                <a:buSzTx/>
+                <a:buFontTx/>
+                <a:buNone/>
+                <a:tabLst/>
+              </a:pPr>
+              <a:r>
+                <a:rPr kumimoji="0" lang="en-US" altLang="ko-KR" sz="700" b="0" i="0" u="none" strike="noStrike" cap="none" normalizeH="0" baseline="0" dirty="0" err="1" smtClean="0">
+                  <a:ln>
+                    <a:noFill/>
+                  </a:ln>
+                  <a:effectLst/>
+                  <a:latin typeface="Arial" charset="0"/>
+                </a:rPr>
+                <a:t>Dbg</a:t>
+              </a:r>
+              <a:endParaRPr kumimoji="0" lang="ko-KR" altLang="en-US" sz="700" b="0" i="0" u="none" strike="noStrike" cap="none" normalizeH="0" baseline="0" dirty="0" smtClean="0">
+                <a:ln>
+                  <a:noFill/>
+                </a:ln>
+                <a:effectLst/>
+                <a:latin typeface="Arial" charset="0"/>
+              </a:endParaRPr>
+            </a:p>
+          </p:txBody>
+        </p:sp>
+      </p:grpSp>
     </p:spTree>
     <p:extLst>
       <p:ext uri="{BB962C8B-B14F-4D97-AF65-F5344CB8AC3E}">
@@ -10746,8 +11253,8 @@
           <a:lstStyle/>
           <a:p>
             <a:r>
-              <a:rPr lang="en-US" altLang="ko-KR" dirty="0" err="1" smtClean="0"/>
-              <a:t>DevIL</a:t>
+              <a:rPr lang="en-US" altLang="ko-KR" dirty="0" smtClean="0"/>
+              <a:t>Cairo</a:t>
             </a:r>
             <a:endParaRPr lang="ko-KR" altLang="en-US" dirty="0"/>
           </a:p>
@@ -10820,7 +11327,7 @@
     </p:spTree>
     <p:extLst>
       <p:ext uri="{BB962C8B-B14F-4D97-AF65-F5344CB8AC3E}">
-        <p14:creationId xmlns:p14="http://schemas.microsoft.com/office/powerpoint/2010/main" val="672090213"/>
+        <p14:creationId xmlns:p14="http://schemas.microsoft.com/office/powerpoint/2010/main" val="2006130297"/>
       </p:ext>
     </p:extLst>
   </p:cSld>
@@ -10863,8 +11370,8 @@
           <a:lstStyle/>
           <a:p>
             <a:r>
-              <a:rPr lang="en-US" altLang="ko-KR" dirty="0" smtClean="0"/>
-              <a:t>GD</a:t>
+              <a:rPr lang="en-US" altLang="ko-KR" dirty="0" err="1" smtClean="0"/>
+              <a:t>DevIL</a:t>
             </a:r>
             <a:endParaRPr lang="ko-KR" altLang="en-US" dirty="0"/>
           </a:p>
@@ -10903,13 +11410,8 @@
             <a:pPr lvl="1"/>
             <a:r>
               <a:rPr lang="en-US" altLang="ko-KR" dirty="0"/>
-              <a:t>Build mode: </a:t>
-            </a:r>
-            <a:r>
-              <a:rPr lang="en-US" altLang="ko-KR" dirty="0" smtClean="0"/>
-              <a:t>Release</a:t>
-            </a:r>
-            <a:endParaRPr lang="en-US" altLang="ko-KR" dirty="0"/>
+              <a:t>Build mode: Release / Debug</a:t>
+            </a:r>
           </a:p>
           <a:p>
             <a:pPr lvl="1"/>
@@ -10923,14 +11425,6 @@
               <a:rPr lang="en-US" altLang="ko-KR" dirty="0" smtClean="0"/>
               <a:t>Dependent libraries (suppliers)</a:t>
             </a:r>
-          </a:p>
-          <a:p>
-            <a:pPr lvl="1"/>
-            <a:r>
-              <a:rPr lang="en-US" altLang="ko-KR" dirty="0" err="1" smtClean="0"/>
-              <a:t>FreeType</a:t>
-            </a:r>
-            <a:endParaRPr lang="en-US" altLang="ko-KR" dirty="0" smtClean="0"/>
           </a:p>
           <a:p>
             <a:r>
@@ -10950,7 +11444,7 @@
     </p:spTree>
     <p:extLst>
       <p:ext uri="{BB962C8B-B14F-4D97-AF65-F5344CB8AC3E}">
-        <p14:creationId xmlns:p14="http://schemas.microsoft.com/office/powerpoint/2010/main" val="359732855"/>
+        <p14:creationId xmlns:p14="http://schemas.microsoft.com/office/powerpoint/2010/main" val="672090213"/>
       </p:ext>
     </p:extLst>
   </p:cSld>
@@ -10993,8 +11487,8 @@
           <a:lstStyle/>
           <a:p>
             <a:r>
-              <a:rPr lang="en-US" altLang="ko-KR" dirty="0" err="1" smtClean="0"/>
-              <a:t>PLplot</a:t>
+              <a:rPr lang="en-US" altLang="ko-KR" dirty="0" smtClean="0"/>
+              <a:t>GD</a:t>
             </a:r>
             <a:endParaRPr lang="ko-KR" altLang="en-US" dirty="0"/>
           </a:p>
@@ -11026,13 +11520,8 @@
             <a:pPr lvl="1"/>
             <a:r>
               <a:rPr lang="en-US" altLang="ko-KR" dirty="0"/>
-              <a:t>Link mode: </a:t>
-            </a:r>
-            <a:r>
-              <a:rPr lang="en-US" altLang="ko-KR" dirty="0" smtClean="0"/>
-              <a:t>Shared</a:t>
-            </a:r>
-            <a:endParaRPr lang="en-US" altLang="ko-KR" dirty="0"/>
+              <a:t>Link mode: Shared / Static</a:t>
+            </a:r>
           </a:p>
           <a:p>
             <a:pPr lvl="1"/>
@@ -11064,22 +11553,6 @@
             <a:r>
               <a:rPr lang="en-US" altLang="ko-KR" dirty="0" err="1" smtClean="0"/>
               <a:t>FreeType</a:t>
-            </a:r>
-            <a:r>
-              <a:rPr lang="en-US" altLang="ko-KR" dirty="0" smtClean="0"/>
-              <a:t>, GD, </a:t>
-            </a:r>
-            <a:r>
-              <a:rPr lang="en-US" altLang="ko-KR" dirty="0" err="1" smtClean="0"/>
-              <a:t>Qhull</a:t>
-            </a:r>
-            <a:r>
-              <a:rPr lang="en-US" altLang="ko-KR" dirty="0" smtClean="0"/>
-              <a:t>, </a:t>
-            </a:r>
-            <a:r>
-              <a:rPr lang="en-US" altLang="ko-KR" dirty="0" err="1" smtClean="0"/>
-              <a:t>wxWidgets</a:t>
             </a:r>
             <a:endParaRPr lang="en-US" altLang="ko-KR" dirty="0" smtClean="0"/>
           </a:p>
@@ -11101,7 +11574,7 @@
     </p:spTree>
     <p:extLst>
       <p:ext uri="{BB962C8B-B14F-4D97-AF65-F5344CB8AC3E}">
-        <p14:creationId xmlns:p14="http://schemas.microsoft.com/office/powerpoint/2010/main" val="2341443332"/>
+        <p14:creationId xmlns:p14="http://schemas.microsoft.com/office/powerpoint/2010/main" val="359732855"/>
       </p:ext>
     </p:extLst>
   </p:cSld>
@@ -11145,7 +11618,7 @@
           <a:p>
             <a:r>
               <a:rPr lang="en-US" altLang="ko-KR" dirty="0" err="1" smtClean="0"/>
-              <a:t>wxWidgets</a:t>
+              <a:t>PLplot</a:t>
             </a:r>
             <a:endParaRPr lang="ko-KR" altLang="en-US" dirty="0"/>
           </a:p>
@@ -11177,15 +11650,25 @@
             <a:pPr lvl="1"/>
             <a:r>
               <a:rPr lang="en-US" altLang="ko-KR" dirty="0"/>
-              <a:t>Link mode: Shared / Static</a:t>
-            </a:r>
+              <a:t>Link mode: </a:t>
+            </a:r>
+            <a:r>
+              <a:rPr lang="en-US" altLang="ko-KR" dirty="0" smtClean="0"/>
+              <a:t>Shared</a:t>
+            </a:r>
+            <a:endParaRPr lang="en-US" altLang="ko-KR" dirty="0"/>
           </a:p>
           <a:p>
             <a:pPr lvl="1"/>
             <a:r>
               <a:rPr lang="en-US" altLang="ko-KR" dirty="0"/>
-              <a:t>Build mode: Release / Debug</a:t>
-            </a:r>
+              <a:t>Build mode: </a:t>
+            </a:r>
+            <a:r>
+              <a:rPr lang="en-US" altLang="ko-KR" dirty="0" smtClean="0"/>
+              <a:t>Release</a:t>
+            </a:r>
+            <a:endParaRPr lang="en-US" altLang="ko-KR" dirty="0"/>
           </a:p>
           <a:p>
             <a:pPr lvl="1"/>
@@ -11199,6 +11682,30 @@
               <a:rPr lang="en-US" altLang="ko-KR" dirty="0" smtClean="0"/>
               <a:t>Dependent libraries (suppliers)</a:t>
             </a:r>
+          </a:p>
+          <a:p>
+            <a:pPr lvl="1"/>
+            <a:r>
+              <a:rPr lang="en-US" altLang="ko-KR" dirty="0" err="1" smtClean="0"/>
+              <a:t>FreeType</a:t>
+            </a:r>
+            <a:r>
+              <a:rPr lang="en-US" altLang="ko-KR" dirty="0" smtClean="0"/>
+              <a:t>, GD, </a:t>
+            </a:r>
+            <a:r>
+              <a:rPr lang="en-US" altLang="ko-KR" dirty="0" err="1" smtClean="0"/>
+              <a:t>Qhull</a:t>
+            </a:r>
+            <a:r>
+              <a:rPr lang="en-US" altLang="ko-KR" dirty="0" smtClean="0"/>
+              <a:t>, </a:t>
+            </a:r>
+            <a:r>
+              <a:rPr lang="en-US" altLang="ko-KR" dirty="0" err="1" smtClean="0"/>
+              <a:t>wxWidgets</a:t>
+            </a:r>
+            <a:endParaRPr lang="en-US" altLang="ko-KR" dirty="0" smtClean="0"/>
           </a:p>
           <a:p>
             <a:r>
@@ -11218,7 +11725,7 @@
     </p:spTree>
     <p:extLst>
       <p:ext uri="{BB962C8B-B14F-4D97-AF65-F5344CB8AC3E}">
-        <p14:creationId xmlns:p14="http://schemas.microsoft.com/office/powerpoint/2010/main" val="672090213"/>
+        <p14:creationId xmlns:p14="http://schemas.microsoft.com/office/powerpoint/2010/main" val="2341443332"/>
       </p:ext>
     </p:extLst>
   </p:cSld>
@@ -11261,8 +11768,8 @@
           <a:lstStyle/>
           <a:p>
             <a:r>
-              <a:rPr lang="en-US" altLang="ko-KR" dirty="0" smtClean="0"/>
-              <a:t>GTK</a:t>
+              <a:rPr lang="en-US" altLang="ko-KR" dirty="0" err="1" smtClean="0"/>
+              <a:t>wxWidgets</a:t>
             </a:r>
             <a:endParaRPr lang="ko-KR" altLang="en-US" dirty="0"/>
           </a:p>
@@ -11335,7 +11842,7 @@
     </p:spTree>
     <p:extLst>
       <p:ext uri="{BB962C8B-B14F-4D97-AF65-F5344CB8AC3E}">
-        <p14:creationId xmlns:p14="http://schemas.microsoft.com/office/powerpoint/2010/main" val="2658382058"/>
+        <p14:creationId xmlns:p14="http://schemas.microsoft.com/office/powerpoint/2010/main" val="672090213"/>
       </p:ext>
     </p:extLst>
   </p:cSld>
@@ -11378,8 +11885,8 @@
           <a:lstStyle/>
           <a:p>
             <a:r>
-              <a:rPr lang="en-US" altLang="ko-KR" dirty="0" err="1" smtClean="0"/>
-              <a:t>Qt</a:t>
+              <a:rPr lang="en-US" altLang="ko-KR" dirty="0" smtClean="0"/>
+              <a:t>GTK</a:t>
             </a:r>
             <a:endParaRPr lang="ko-KR" altLang="en-US" dirty="0"/>
           </a:p>
@@ -11496,7 +12003,7 @@
           <a:p>
             <a:r>
               <a:rPr lang="en-US" altLang="ko-KR" dirty="0" err="1" smtClean="0"/>
-              <a:t>OpenSceneGraph</a:t>
+              <a:t>Qt</a:t>
             </a:r>
             <a:endParaRPr lang="ko-KR" altLang="en-US" dirty="0"/>
           </a:p>
@@ -11569,7 +12076,7 @@
     </p:spTree>
     <p:extLst>
       <p:ext uri="{BB962C8B-B14F-4D97-AF65-F5344CB8AC3E}">
-        <p14:creationId xmlns:p14="http://schemas.microsoft.com/office/powerpoint/2010/main" val="2689837027"/>
+        <p14:creationId xmlns:p14="http://schemas.microsoft.com/office/powerpoint/2010/main" val="2658382058"/>
       </p:ext>
     </p:extLst>
   </p:cSld>
@@ -11612,8 +12119,8 @@
           <a:lstStyle/>
           <a:p>
             <a:r>
-              <a:rPr lang="en-US" altLang="ko-KR" dirty="0" smtClean="0"/>
-              <a:t>Ogre 3D</a:t>
+              <a:rPr lang="en-US" altLang="ko-KR" dirty="0" err="1" smtClean="0"/>
+              <a:t>OpenSceneGraph</a:t>
             </a:r>
             <a:endParaRPr lang="ko-KR" altLang="en-US" dirty="0"/>
           </a:p>
@@ -11632,7 +12139,7 @@
         <p:spPr/>
         <p:txBody>
           <a:bodyPr>
-            <a:normAutofit lnSpcReduction="10000"/>
+            <a:normAutofit/>
           </a:bodyPr>
           <a:lstStyle/>
           <a:p>
@@ -11665,139 +12172,19 @@
           <a:p>
             <a:r>
               <a:rPr lang="en-US" altLang="ko-KR" dirty="0" smtClean="0"/>
-              <a:t>Dependent </a:t>
-            </a:r>
-            <a:r>
-              <a:rPr lang="en-US" altLang="ko-KR" dirty="0"/>
-              <a:t>libraries (suppliers</a:t>
-            </a:r>
+              <a:t>Dependent libraries (suppliers)</a:t>
+            </a:r>
+          </a:p>
+          <a:p>
             <a:r>
               <a:rPr lang="en-US" altLang="ko-KR" dirty="0" smtClean="0"/>
-              <a:t>)</a:t>
-            </a:r>
-          </a:p>
-          <a:p>
-            <a:pPr lvl="1"/>
-            <a:r>
-              <a:rPr lang="en-US" altLang="ko-KR" sz="2800" dirty="0" smtClean="0"/>
-              <a:t>Boost, </a:t>
-            </a:r>
-            <a:r>
-              <a:rPr lang="en-US" altLang="ko-KR" sz="2800" dirty="0" err="1" smtClean="0"/>
-              <a:t>zlib</a:t>
-            </a:r>
-            <a:r>
-              <a:rPr lang="en-US" altLang="ko-KR" sz="2800" dirty="0" smtClean="0"/>
-              <a:t>, </a:t>
-            </a:r>
-            <a:r>
-              <a:rPr lang="en-US" altLang="ko-KR" sz="2800" dirty="0" err="1" smtClean="0"/>
-              <a:t>zzip</a:t>
-            </a:r>
-            <a:r>
-              <a:rPr lang="en-US" altLang="ko-KR" sz="2800" dirty="0" smtClean="0"/>
-              <a:t>, </a:t>
-            </a:r>
-            <a:r>
-              <a:rPr lang="en-US" altLang="ko-KR" sz="2800" dirty="0" err="1" smtClean="0"/>
-              <a:t>FreeType</a:t>
-            </a:r>
-            <a:r>
-              <a:rPr lang="en-US" altLang="ko-KR" sz="2800" dirty="0" smtClean="0"/>
-              <a:t>, </a:t>
-            </a:r>
-            <a:r>
-              <a:rPr lang="en-US" altLang="ko-KR" sz="2800" dirty="0" err="1" smtClean="0"/>
-              <a:t>FreeImage</a:t>
-            </a:r>
-            <a:r>
-              <a:rPr lang="en-US" altLang="ko-KR" sz="2800" dirty="0" smtClean="0"/>
-              <a:t>, </a:t>
-            </a:r>
-            <a:r>
-              <a:rPr lang="en-US" altLang="ko-KR" sz="2800" dirty="0"/>
-              <a:t>OpenGL, DirectX</a:t>
-            </a:r>
-            <a:r>
-              <a:rPr lang="en-US" altLang="ko-KR" sz="2800" dirty="0" smtClean="0"/>
-              <a:t>, TBB, </a:t>
-            </a:r>
-            <a:r>
-              <a:rPr lang="en-US" altLang="ko-KR" sz="2800" dirty="0" err="1" smtClean="0"/>
-              <a:t>CppUnit</a:t>
-            </a:r>
-            <a:r>
-              <a:rPr lang="en-US" altLang="ko-KR" sz="2800" dirty="0" smtClean="0"/>
-              <a:t>, POCO, OIS, Cg</a:t>
-            </a:r>
-            <a:endParaRPr lang="en-US" altLang="ko-KR" dirty="0"/>
-          </a:p>
-          <a:p>
-            <a:r>
-              <a:rPr lang="en-US" altLang="ko-KR" dirty="0"/>
-              <a:t>Using libraries (</a:t>
-            </a:r>
+              <a:t>Using libraries (clients)</a:t>
+            </a:r>
+          </a:p>
+          <a:p>
             <a:r>
               <a:rPr lang="en-US" altLang="ko-KR" dirty="0" smtClean="0"/>
-              <a:t>clients)</a:t>
-            </a:r>
-            <a:endParaRPr lang="en-US" altLang="ko-KR" dirty="0"/>
-          </a:p>
-          <a:p>
-            <a:r>
-              <a:rPr lang="en-US" altLang="ko-KR" dirty="0"/>
-              <a:t>Building </a:t>
-            </a:r>
-            <a:r>
-              <a:rPr lang="en-US" altLang="ko-KR" dirty="0" smtClean="0"/>
-              <a:t>tips</a:t>
-            </a:r>
-          </a:p>
-          <a:p>
-            <a:pPr lvl="1"/>
-            <a:r>
-              <a:rPr lang="en-US" altLang="ko-KR" dirty="0" err="1" smtClean="0"/>
-              <a:t>FreeImage</a:t>
-            </a:r>
-            <a:r>
-              <a:rPr lang="ko-KR" altLang="en-US" dirty="0" smtClean="0"/>
-              <a:t>를 </a:t>
-            </a:r>
-            <a:r>
-              <a:rPr lang="en-US" altLang="ko-KR" dirty="0" smtClean="0"/>
-              <a:t>shared library</a:t>
-            </a:r>
-            <a:r>
-              <a:rPr lang="ko-KR" altLang="en-US" dirty="0" smtClean="0"/>
-              <a:t> </a:t>
-            </a:r>
-            <a:r>
-              <a:rPr lang="en-US" altLang="ko-KR" dirty="0" smtClean="0"/>
-              <a:t>linking</a:t>
-            </a:r>
-            <a:r>
-              <a:rPr lang="ko-KR" altLang="en-US" dirty="0" smtClean="0"/>
-              <a:t>하기 위해서 </a:t>
-            </a:r>
-            <a:r>
-              <a:rPr lang="en-US" altLang="ko-KR" dirty="0" smtClean="0"/>
-              <a:t>FREEIMAGE_LIB</a:t>
-            </a:r>
-            <a:r>
-              <a:rPr lang="ko-KR" altLang="en-US" dirty="0"/>
-              <a:t> </a:t>
-            </a:r>
-            <a:r>
-              <a:rPr lang="en-US" altLang="ko-KR" dirty="0" smtClean="0"/>
-              <a:t>macro</a:t>
-            </a:r>
-            <a:r>
-              <a:rPr lang="ko-KR" altLang="en-US" dirty="0" smtClean="0"/>
-              <a:t>를 정의하지 않아야 한다</a:t>
-            </a:r>
-            <a:r>
-              <a:rPr lang="en-US" altLang="ko-KR" dirty="0" smtClean="0"/>
-              <a:t>.</a:t>
+              <a:t>Building tips</a:t>
             </a:r>
             <a:endParaRPr lang="ko-KR" altLang="en-US" dirty="0"/>
           </a:p>
@@ -11806,7 +12193,7 @@
     </p:spTree>
     <p:extLst>
       <p:ext uri="{BB962C8B-B14F-4D97-AF65-F5344CB8AC3E}">
-        <p14:creationId xmlns:p14="http://schemas.microsoft.com/office/powerpoint/2010/main" val="4046191695"/>
+        <p14:creationId xmlns:p14="http://schemas.microsoft.com/office/powerpoint/2010/main" val="2689837027"/>
       </p:ext>
     </p:extLst>
   </p:cSld>
@@ -11850,7 +12237,7 @@
           <a:p>
             <a:r>
               <a:rPr lang="en-US" altLang="ko-KR" dirty="0" smtClean="0"/>
-              <a:t>CGAL</a:t>
+              <a:t>Ogre 3D</a:t>
             </a:r>
             <a:endParaRPr lang="ko-KR" altLang="en-US" dirty="0"/>
           </a:p>
@@ -11869,7 +12256,7 @@
         <p:spPr/>
         <p:txBody>
           <a:bodyPr>
-            <a:normAutofit fontScale="70000" lnSpcReduction="20000"/>
+            <a:normAutofit lnSpcReduction="10000"/>
           </a:bodyPr>
           <a:lstStyle/>
           <a:p>
@@ -11882,13 +12269,8 @@
             <a:pPr lvl="1"/>
             <a:r>
               <a:rPr lang="en-US" altLang="ko-KR" dirty="0"/>
-              <a:t>Link mode: </a:t>
-            </a:r>
-            <a:r>
-              <a:rPr lang="en-US" altLang="ko-KR" dirty="0" smtClean="0"/>
-              <a:t>Static</a:t>
-            </a:r>
-            <a:endParaRPr lang="en-US" altLang="ko-KR" dirty="0"/>
+              <a:t>Link mode: Shared / Static</a:t>
+            </a:r>
           </a:p>
           <a:p>
             <a:pPr lvl="1"/>
@@ -11907,62 +12289,99 @@
           <a:p>
             <a:r>
               <a:rPr lang="en-US" altLang="ko-KR" dirty="0" smtClean="0"/>
-              <a:t>Dependent libraries (suppliers)</a:t>
+              <a:t>Dependent </a:t>
+            </a:r>
+            <a:r>
+              <a:rPr lang="en-US" altLang="ko-KR" dirty="0"/>
+              <a:t>libraries (suppliers</a:t>
+            </a:r>
+            <a:r>
+              <a:rPr lang="en-US" altLang="ko-KR" dirty="0" smtClean="0"/>
+              <a:t>)</a:t>
             </a:r>
           </a:p>
           <a:p>
             <a:pPr lvl="1"/>
             <a:r>
+              <a:rPr lang="en-US" altLang="ko-KR" sz="2800" dirty="0" smtClean="0"/>
+              <a:t>Boost, </a:t>
+            </a:r>
+            <a:r>
+              <a:rPr lang="en-US" altLang="ko-KR" sz="2800" dirty="0" err="1" smtClean="0"/>
+              <a:t>zlib</a:t>
+            </a:r>
+            <a:r>
+              <a:rPr lang="en-US" altLang="ko-KR" sz="2800" dirty="0" smtClean="0"/>
+              <a:t>, </a:t>
+            </a:r>
+            <a:r>
+              <a:rPr lang="en-US" altLang="ko-KR" sz="2800" dirty="0" err="1" smtClean="0"/>
+              <a:t>zzip</a:t>
+            </a:r>
+            <a:r>
+              <a:rPr lang="en-US" altLang="ko-KR" sz="2800" dirty="0" smtClean="0"/>
+              <a:t>, </a:t>
+            </a:r>
+            <a:r>
+              <a:rPr lang="en-US" altLang="ko-KR" sz="2800" dirty="0" err="1" smtClean="0"/>
+              <a:t>FreeType</a:t>
+            </a:r>
+            <a:r>
+              <a:rPr lang="en-US" altLang="ko-KR" sz="2800" dirty="0" smtClean="0"/>
+              <a:t>, </a:t>
+            </a:r>
+            <a:r>
+              <a:rPr lang="en-US" altLang="ko-KR" sz="2800" dirty="0" err="1" smtClean="0"/>
+              <a:t>FreeImage</a:t>
+            </a:r>
+            <a:r>
+              <a:rPr lang="en-US" altLang="ko-KR" sz="2800" dirty="0" smtClean="0"/>
+              <a:t>, </a:t>
+            </a:r>
+            <a:r>
+              <a:rPr lang="en-US" altLang="ko-KR" sz="2800" dirty="0"/>
+              <a:t>OpenGL, DirectX</a:t>
+            </a:r>
+            <a:r>
+              <a:rPr lang="en-US" altLang="ko-KR" sz="2800" dirty="0" smtClean="0"/>
+              <a:t>, TBB, </a:t>
+            </a:r>
+            <a:r>
+              <a:rPr lang="en-US" altLang="ko-KR" sz="2800" dirty="0" err="1" smtClean="0"/>
+              <a:t>CppUnit</a:t>
+            </a:r>
+            <a:r>
+              <a:rPr lang="en-US" altLang="ko-KR" sz="2800" dirty="0" smtClean="0"/>
+              <a:t>, POCO, OIS, Cg</a:t>
+            </a:r>
+            <a:endParaRPr lang="en-US" altLang="ko-KR" dirty="0"/>
+          </a:p>
+          <a:p>
+            <a:r>
+              <a:rPr lang="en-US" altLang="ko-KR" dirty="0"/>
+              <a:t>Using libraries (</a:t>
+            </a:r>
+            <a:r>
               <a:rPr lang="en-US" altLang="ko-KR" dirty="0" smtClean="0"/>
-              <a:t>Boost, </a:t>
-            </a:r>
+              <a:t>clients)</a:t>
+            </a:r>
+            <a:endParaRPr lang="en-US" altLang="ko-KR" dirty="0"/>
+          </a:p>
+          <a:p>
+            <a:r>
+              <a:rPr lang="en-US" altLang="ko-KR" dirty="0"/>
+              <a:t>Building </a:t>
+            </a:r>
+            <a:r>
+              <a:rPr lang="en-US" altLang="ko-KR" dirty="0" smtClean="0"/>
+              <a:t>tips</a:t>
+            </a:r>
+          </a:p>
+          <a:p>
+            <a:pPr lvl="1"/>
             <a:r>
               <a:rPr lang="en-US" altLang="ko-KR" dirty="0" err="1" smtClean="0"/>
-              <a:t>zlib</a:t>
-            </a:r>
-            <a:r>
-              <a:rPr lang="en-US" altLang="ko-KR" dirty="0" smtClean="0"/>
-              <a:t>, BLAS, LAPACK, TAUCS, GMP, MPFR, MPFI, MKL, OpenGL, </a:t>
-            </a:r>
-            <a:r>
-              <a:rPr lang="en-US" altLang="ko-KR" dirty="0" err="1" smtClean="0"/>
-              <a:t>Qt</a:t>
-            </a:r>
-            <a:endParaRPr lang="en-US" altLang="ko-KR" dirty="0" smtClean="0"/>
-          </a:p>
-          <a:p>
-            <a:r>
-              <a:rPr lang="en-US" altLang="ko-KR" dirty="0" smtClean="0"/>
-              <a:t>Using libraries (clients)</a:t>
-            </a:r>
-          </a:p>
-          <a:p>
-            <a:r>
-              <a:rPr lang="en-US" altLang="ko-KR" dirty="0" smtClean="0"/>
-              <a:t>Building tips</a:t>
-            </a:r>
-          </a:p>
-          <a:p>
-            <a:pPr lvl="1"/>
-            <a:r>
-              <a:rPr lang="en-US" altLang="ko-KR" dirty="0" smtClean="0"/>
-              <a:t>Boost 1.48.0</a:t>
-            </a:r>
-            <a:r>
-              <a:rPr lang="ko-KR" altLang="en-US" dirty="0" smtClean="0"/>
-              <a:t>을 이용해 </a:t>
-            </a:r>
-            <a:r>
-              <a:rPr lang="en-US" altLang="ko-KR" dirty="0" smtClean="0"/>
-              <a:t>CGAL-3.9</a:t>
-            </a:r>
-            <a:r>
-              <a:rPr lang="ko-KR" altLang="en-US" dirty="0" smtClean="0"/>
-              <a:t>의 </a:t>
-            </a:r>
-            <a:r>
-              <a:rPr lang="en-US" altLang="ko-KR" dirty="0" smtClean="0"/>
-              <a:t>CGAL_Qt4 project</a:t>
+              <a:t>FreeImage</a:t>
             </a:r>
             <a:r>
               <a:rPr lang="ko-KR" altLang="en-US" dirty="0" smtClean="0"/>
@@ -11970,99 +12389,23 @@
             </a:r>
             <a:r>
               <a:rPr lang="en-US" altLang="ko-KR" dirty="0" smtClean="0"/>
-              <a:t>compile</a:t>
+              <a:t>shared library</a:t>
             </a:r>
             <a:r>
               <a:rPr lang="ko-KR" altLang="en-US" dirty="0" smtClean="0"/>
-              <a:t>하는 경우 </a:t>
+              <a:t> </a:t>
             </a:r>
             <a:r>
               <a:rPr lang="en-US" altLang="ko-KR" dirty="0" smtClean="0"/>
-              <a:t>‘Parse </a:t>
-            </a:r>
-            <a:r>
-              <a:rPr lang="en-US" altLang="ko-KR" dirty="0"/>
-              <a:t>error at </a:t>
+              <a:t>linking</a:t>
+            </a:r>
+            <a:r>
+              <a:rPr lang="ko-KR" altLang="en-US" dirty="0" smtClean="0"/>
+              <a:t>하기 위해서 </a:t>
             </a:r>
             <a:r>
               <a:rPr lang="en-US" altLang="ko-KR" dirty="0" smtClean="0"/>
-              <a:t>“BOOST_JOIN”’ error</a:t>
-            </a:r>
-            <a:r>
-              <a:rPr lang="ko-KR" altLang="en-US" dirty="0" smtClean="0"/>
-              <a:t>가 발생하는데 아래의 </a:t>
-            </a:r>
-            <a:r>
-              <a:rPr lang="en-US" altLang="ko-KR" dirty="0" smtClean="0"/>
-              <a:t>file</a:t>
-            </a:r>
-            <a:r>
-              <a:rPr lang="ko-KR" altLang="en-US" dirty="0" smtClean="0"/>
-              <a:t>에 </a:t>
-            </a:r>
-            <a:r>
-              <a:rPr lang="en-US" altLang="ko-KR" dirty="0"/>
-              <a:t>-</a:t>
-            </a:r>
-            <a:r>
-              <a:rPr lang="en-US" altLang="ko-KR" dirty="0" smtClean="0"/>
-              <a:t>DBOOST_TT_HAS_OPERATOR_HPP_INCLUDED</a:t>
-            </a:r>
-            <a:r>
-              <a:rPr lang="ko-KR" altLang="en-US" dirty="0" smtClean="0"/>
-              <a:t>를</a:t>
-            </a:r>
-            <a:r>
-              <a:rPr lang="en-US" altLang="ko-KR" dirty="0" smtClean="0"/>
-              <a:t> </a:t>
-            </a:r>
-            <a:r>
-              <a:rPr lang="ko-KR" altLang="en-US" dirty="0" smtClean="0"/>
-              <a:t>추가하면 문제를 해결할 수 있음</a:t>
-            </a:r>
-            <a:endParaRPr lang="en-US" altLang="ko-KR" dirty="0" smtClean="0"/>
-          </a:p>
-          <a:p>
-            <a:pPr lvl="2"/>
-            <a:r>
-              <a:rPr lang="en-US" altLang="ko-KR" dirty="0" err="1" smtClean="0"/>
-              <a:t>moc_GraphicsItem.cxx_parameters</a:t>
-            </a:r>
-            <a:endParaRPr lang="en-US" altLang="ko-KR" dirty="0" smtClean="0"/>
-          </a:p>
-          <a:p>
-            <a:pPr lvl="2"/>
-            <a:r>
-              <a:rPr lang="en-US" altLang="ko-KR" dirty="0" err="1" smtClean="0"/>
-              <a:t>moc_GraphicsViewInput.cxx_parameters</a:t>
-            </a:r>
-            <a:endParaRPr lang="en-US" altLang="ko-KR" dirty="0" smtClean="0"/>
-          </a:p>
-          <a:p>
-            <a:pPr lvl="2"/>
-            <a:r>
-              <a:rPr lang="en-US" altLang="ko-KR" dirty="0" smtClean="0"/>
-              <a:t>[ref] </a:t>
-            </a:r>
-            <a:r>
-              <a:rPr lang="en-US" altLang="ko-KR" dirty="0">
-                <a:hlinkClick r:id="rId2"/>
-              </a:rPr>
-              <a:t>https://</a:t>
-            </a:r>
-            <a:r>
-              <a:rPr lang="en-US" altLang="ko-KR" dirty="0" smtClean="0">
-                <a:hlinkClick r:id="rId2"/>
-              </a:rPr>
-              <a:t>bugreports.qt.nokia.com/browse/QTBUG-22829</a:t>
-            </a:r>
-            <a:endParaRPr lang="en-US" altLang="ko-KR" dirty="0" smtClean="0"/>
-          </a:p>
-          <a:p>
-            <a:pPr lvl="1"/>
-            <a:r>
-              <a:rPr lang="en-US" altLang="ko-KR" dirty="0" smtClean="0"/>
-              <a:t>CGAL-3.9</a:t>
+              <a:t>FREEIMAGE_LIB</a:t>
             </a:r>
             <a:r>
               <a:rPr lang="ko-KR" altLang="en-US" dirty="0"/>
@@ -12070,44 +12413,24 @@
             </a:r>
             <a:r>
               <a:rPr lang="en-US" altLang="ko-KR" dirty="0" smtClean="0"/>
-              <a:t>library</a:t>
+              <a:t>macro</a:t>
             </a:r>
             <a:r>
               <a:rPr lang="ko-KR" altLang="en-US" dirty="0" smtClean="0"/>
-              <a:t>를 사용하기 위해서는 </a:t>
+              <a:t>를 정의하지 않아야 한다</a:t>
             </a:r>
             <a:r>
               <a:rPr lang="en-US" altLang="ko-KR" dirty="0" smtClean="0"/>
-              <a:t>CGAL_NO_AUTOLINK_GMP &amp;</a:t>
-            </a:r>
-            <a:r>
-              <a:rPr lang="en-US" altLang="ko-KR" dirty="0"/>
-              <a:t> </a:t>
-            </a:r>
-            <a:r>
-              <a:rPr lang="en-US" altLang="ko-KR" dirty="0" smtClean="0"/>
-              <a:t>CGAL_NO_AUTOLINK_MPFR macro</a:t>
-            </a:r>
-            <a:r>
-              <a:rPr lang="ko-KR" altLang="en-US" dirty="0" smtClean="0"/>
-              <a:t>를 설정하고 사용하고자 하는 </a:t>
-            </a:r>
-            <a:r>
-              <a:rPr lang="en-US" altLang="ko-KR" dirty="0" smtClean="0"/>
-              <a:t>GMP &amp; MPFR library name</a:t>
-            </a:r>
-            <a:r>
-              <a:rPr lang="ko-KR" altLang="en-US" smtClean="0"/>
-              <a:t>을 직접 지정하여야 함</a:t>
-            </a:r>
-            <a:endParaRPr lang="en-US" altLang="ko-KR" dirty="0" smtClean="0"/>
+              <a:t>.</a:t>
+            </a:r>
+            <a:endParaRPr lang="ko-KR" altLang="en-US" dirty="0"/>
           </a:p>
         </p:txBody>
       </p:sp>
     </p:spTree>
     <p:extLst>
       <p:ext uri="{BB962C8B-B14F-4D97-AF65-F5344CB8AC3E}">
-        <p14:creationId xmlns:p14="http://schemas.microsoft.com/office/powerpoint/2010/main" val="2585627393"/>
+        <p14:creationId xmlns:p14="http://schemas.microsoft.com/office/powerpoint/2010/main" val="4046191695"/>
       </p:ext>
     </p:extLst>
   </p:cSld>
@@ -12150,8 +12473,8 @@
           <a:lstStyle/>
           <a:p>
             <a:r>
-              <a:rPr lang="en-US" altLang="ko-KR" dirty="0" err="1" smtClean="0"/>
-              <a:t>OpenMesh</a:t>
+              <a:rPr lang="en-US" altLang="ko-KR" dirty="0" smtClean="0"/>
+              <a:t>CGAL</a:t>
             </a:r>
             <a:endParaRPr lang="ko-KR" altLang="en-US" dirty="0"/>
           </a:p>
@@ -12170,7 +12493,7 @@
         <p:spPr/>
         <p:txBody>
           <a:bodyPr>
-            <a:normAutofit/>
+            <a:normAutofit fontScale="70000" lnSpcReduction="20000"/>
           </a:bodyPr>
           <a:lstStyle/>
           <a:p>
@@ -12183,8 +12506,13 @@
             <a:pPr lvl="1"/>
             <a:r>
               <a:rPr lang="en-US" altLang="ko-KR" dirty="0"/>
-              <a:t>Link mode: Shared / Static</a:t>
-            </a:r>
+              <a:t>Link mode: </a:t>
+            </a:r>
+            <a:r>
+              <a:rPr lang="en-US" altLang="ko-KR" dirty="0" smtClean="0"/>
+              <a:t>Static</a:t>
+            </a:r>
+            <a:endParaRPr lang="en-US" altLang="ko-KR" dirty="0"/>
           </a:p>
           <a:p>
             <a:pPr lvl="1"/>
@@ -12207,6 +12535,26 @@
             </a:r>
           </a:p>
           <a:p>
+            <a:pPr lvl="1"/>
+            <a:r>
+              <a:rPr lang="en-US" altLang="ko-KR" dirty="0" smtClean="0"/>
+              <a:t>Boost, </a:t>
+            </a:r>
+            <a:r>
+              <a:rPr lang="en-US" altLang="ko-KR" dirty="0" err="1" smtClean="0"/>
+              <a:t>zlib</a:t>
+            </a:r>
+            <a:r>
+              <a:rPr lang="en-US" altLang="ko-KR" dirty="0" smtClean="0"/>
+              <a:t>, BLAS, LAPACK, TAUCS, GMP, MPFR, MPFI, MKL, OpenGL, </a:t>
+            </a:r>
+            <a:r>
+              <a:rPr lang="en-US" altLang="ko-KR" dirty="0" err="1" smtClean="0"/>
+              <a:t>Qt</a:t>
+            </a:r>
+            <a:endParaRPr lang="en-US" altLang="ko-KR" dirty="0" smtClean="0"/>
+          </a:p>
+          <a:p>
             <a:r>
               <a:rPr lang="en-US" altLang="ko-KR" dirty="0" smtClean="0"/>
               <a:t>Using libraries (clients)</a:t>
@@ -12217,14 +12565,173 @@
               <a:rPr lang="en-US" altLang="ko-KR" dirty="0" smtClean="0"/>
               <a:t>Building tips</a:t>
             </a:r>
-            <a:endParaRPr lang="ko-KR" altLang="en-US" dirty="0"/>
+          </a:p>
+          <a:p>
+            <a:pPr lvl="1"/>
+            <a:r>
+              <a:rPr lang="en-US" altLang="ko-KR" dirty="0" smtClean="0"/>
+              <a:t>Boost 1.48.0</a:t>
+            </a:r>
+            <a:r>
+              <a:rPr lang="ko-KR" altLang="en-US" dirty="0" smtClean="0"/>
+              <a:t>을 이용해 </a:t>
+            </a:r>
+            <a:r>
+              <a:rPr lang="en-US" altLang="ko-KR" dirty="0" smtClean="0"/>
+              <a:t>CGAL-3.9</a:t>
+            </a:r>
+            <a:r>
+              <a:rPr lang="ko-KR" altLang="en-US" dirty="0" smtClean="0"/>
+              <a:t>의 </a:t>
+            </a:r>
+            <a:r>
+              <a:rPr lang="en-US" altLang="ko-KR" dirty="0" smtClean="0"/>
+              <a:t>CGAL_Qt4 project</a:t>
+            </a:r>
+            <a:r>
+              <a:rPr lang="ko-KR" altLang="en-US" dirty="0" smtClean="0"/>
+              <a:t>를 </a:t>
+            </a:r>
+            <a:r>
+              <a:rPr lang="en-US" altLang="ko-KR" dirty="0" smtClean="0"/>
+              <a:t>compile</a:t>
+            </a:r>
+            <a:r>
+              <a:rPr lang="ko-KR" altLang="en-US" dirty="0" smtClean="0"/>
+              <a:t>하는 경우 </a:t>
+            </a:r>
+            <a:r>
+              <a:rPr lang="en-US" altLang="ko-KR" dirty="0" smtClean="0"/>
+              <a:t>‘Parse </a:t>
+            </a:r>
+            <a:r>
+              <a:rPr lang="en-US" altLang="ko-KR" dirty="0"/>
+              <a:t>error at </a:t>
+            </a:r>
+            <a:r>
+              <a:rPr lang="en-US" altLang="ko-KR" dirty="0" smtClean="0"/>
+              <a:t>“BOOST_JOIN”’ error</a:t>
+            </a:r>
+            <a:r>
+              <a:rPr lang="ko-KR" altLang="en-US" dirty="0" smtClean="0"/>
+              <a:t>가 발생하는데 아래의 </a:t>
+            </a:r>
+            <a:r>
+              <a:rPr lang="en-US" altLang="ko-KR" dirty="0" smtClean="0"/>
+              <a:t>file</a:t>
+            </a:r>
+            <a:r>
+              <a:rPr lang="ko-KR" altLang="en-US" dirty="0" smtClean="0"/>
+              <a:t>에 </a:t>
+            </a:r>
+            <a:r>
+              <a:rPr lang="en-US" altLang="ko-KR" dirty="0"/>
+              <a:t>-</a:t>
+            </a:r>
+            <a:r>
+              <a:rPr lang="en-US" altLang="ko-KR" dirty="0" smtClean="0"/>
+              <a:t>DBOOST_TT_HAS_OPERATOR_HPP_INCLUDED</a:t>
+            </a:r>
+            <a:r>
+              <a:rPr lang="ko-KR" altLang="en-US" dirty="0" smtClean="0"/>
+              <a:t>를</a:t>
+            </a:r>
+            <a:r>
+              <a:rPr lang="en-US" altLang="ko-KR" dirty="0" smtClean="0"/>
+              <a:t> </a:t>
+            </a:r>
+            <a:r>
+              <a:rPr lang="ko-KR" altLang="en-US" dirty="0" smtClean="0"/>
+              <a:t>추가하면 문제를 해결할 수 있음</a:t>
+            </a:r>
+            <a:endParaRPr lang="en-US" altLang="ko-KR" dirty="0" smtClean="0"/>
+          </a:p>
+          <a:p>
+            <a:pPr lvl="2"/>
+            <a:r>
+              <a:rPr lang="en-US" altLang="ko-KR" dirty="0" err="1" smtClean="0"/>
+              <a:t>moc_GraphicsItem.cxx_parameters</a:t>
+            </a:r>
+            <a:endParaRPr lang="en-US" altLang="ko-KR" dirty="0" smtClean="0"/>
+          </a:p>
+          <a:p>
+            <a:pPr lvl="2"/>
+            <a:r>
+              <a:rPr lang="en-US" altLang="ko-KR" dirty="0" err="1" smtClean="0"/>
+              <a:t>moc_GraphicsViewInput.cxx_parameters</a:t>
+            </a:r>
+            <a:endParaRPr lang="en-US" altLang="ko-KR" dirty="0" smtClean="0"/>
+          </a:p>
+          <a:p>
+            <a:pPr lvl="2"/>
+            <a:r>
+              <a:rPr lang="en-US" altLang="ko-KR" dirty="0" smtClean="0"/>
+              <a:t>[ref] </a:t>
+            </a:r>
+            <a:r>
+              <a:rPr lang="en-US" altLang="ko-KR" dirty="0">
+                <a:hlinkClick r:id="rId2"/>
+              </a:rPr>
+              <a:t>https://</a:t>
+            </a:r>
+            <a:r>
+              <a:rPr lang="en-US" altLang="ko-KR" dirty="0" smtClean="0">
+                <a:hlinkClick r:id="rId2"/>
+              </a:rPr>
+              <a:t>bugreports.qt.nokia.com/browse/QTBUG-22829</a:t>
+            </a:r>
+            <a:endParaRPr lang="en-US" altLang="ko-KR" dirty="0" smtClean="0"/>
+          </a:p>
+          <a:p>
+            <a:pPr lvl="1"/>
+            <a:r>
+              <a:rPr lang="en-US" altLang="ko-KR" dirty="0" smtClean="0"/>
+              <a:t>CGAL-3.9</a:t>
+            </a:r>
+            <a:r>
+              <a:rPr lang="ko-KR" altLang="en-US" dirty="0"/>
+              <a:t> </a:t>
+            </a:r>
+            <a:r>
+              <a:rPr lang="en-US" altLang="ko-KR" dirty="0" smtClean="0"/>
+              <a:t>library</a:t>
+            </a:r>
+            <a:r>
+              <a:rPr lang="ko-KR" altLang="en-US" dirty="0" smtClean="0"/>
+              <a:t>를 사용하기 위해서는 </a:t>
+            </a:r>
+            <a:r>
+              <a:rPr lang="en-US" altLang="ko-KR" dirty="0" smtClean="0"/>
+              <a:t>CGAL_NO_AUTOLINK_GMP &amp;</a:t>
+            </a:r>
+            <a:r>
+              <a:rPr lang="en-US" altLang="ko-KR" dirty="0"/>
+              <a:t> </a:t>
+            </a:r>
+            <a:r>
+              <a:rPr lang="en-US" altLang="ko-KR" dirty="0" smtClean="0"/>
+              <a:t>CGAL_NO_AUTOLINK_MPFR macro</a:t>
+            </a:r>
+            <a:r>
+              <a:rPr lang="ko-KR" altLang="en-US" dirty="0" smtClean="0"/>
+              <a:t>를 설정하고 사용하고자 하는 </a:t>
+            </a:r>
+            <a:r>
+              <a:rPr lang="en-US" altLang="ko-KR" dirty="0" smtClean="0"/>
+              <a:t>GMP &amp; MPFR library name</a:t>
+            </a:r>
+            <a:r>
+              <a:rPr lang="ko-KR" altLang="en-US" smtClean="0"/>
+              <a:t>을 직접 지정하여야 함</a:t>
+            </a:r>
+            <a:endParaRPr lang="en-US" altLang="ko-KR" dirty="0" smtClean="0"/>
           </a:p>
         </p:txBody>
       </p:sp>
     </p:spTree>
     <p:extLst>
       <p:ext uri="{BB962C8B-B14F-4D97-AF65-F5344CB8AC3E}">
-        <p14:creationId xmlns:p14="http://schemas.microsoft.com/office/powerpoint/2010/main" val="401210472"/>
+        <p14:creationId xmlns:p14="http://schemas.microsoft.com/office/powerpoint/2010/main" val="2585627393"/>
       </p:ext>
     </p:extLst>
   </p:cSld>
@@ -17423,8 +17930,8 @@
           <a:lstStyle/>
           <a:p>
             <a:r>
-              <a:rPr lang="en-US" altLang="ko-KR" dirty="0" smtClean="0"/>
-              <a:t>VTK</a:t>
+              <a:rPr lang="en-US" altLang="ko-KR" dirty="0" err="1" smtClean="0"/>
+              <a:t>OpenMesh</a:t>
             </a:r>
             <a:endParaRPr lang="ko-KR" altLang="en-US" dirty="0"/>
           </a:p>
@@ -17497,7 +18004,7 @@
     </p:spTree>
     <p:extLst>
       <p:ext uri="{BB962C8B-B14F-4D97-AF65-F5344CB8AC3E}">
-        <p14:creationId xmlns:p14="http://schemas.microsoft.com/office/powerpoint/2010/main" val="1348026829"/>
+        <p14:creationId xmlns:p14="http://schemas.microsoft.com/office/powerpoint/2010/main" val="401210472"/>
       </p:ext>
     </p:extLst>
   </p:cSld>
@@ -17541,7 +18048,7 @@
           <a:p>
             <a:r>
               <a:rPr lang="en-US" altLang="ko-KR" dirty="0" smtClean="0"/>
-              <a:t>ITK</a:t>
+              <a:t>PCL</a:t>
             </a:r>
             <a:endParaRPr lang="ko-KR" altLang="en-US" dirty="0"/>
           </a:p>
@@ -17597,6 +18104,34 @@
             </a:r>
           </a:p>
           <a:p>
+            <a:pPr lvl="1"/>
+            <a:r>
+              <a:rPr lang="en-US" altLang="ko-KR" dirty="0" smtClean="0"/>
+              <a:t>Boost, Eigen, </a:t>
+            </a:r>
+            <a:r>
+              <a:rPr lang="en-US" altLang="ko-KR" dirty="0" err="1" smtClean="0"/>
+              <a:t>Qt</a:t>
+            </a:r>
+            <a:r>
+              <a:rPr lang="en-US" altLang="ko-KR" dirty="0" smtClean="0"/>
+              <a:t>, </a:t>
+            </a:r>
+            <a:r>
+              <a:rPr lang="en-US" altLang="ko-KR" dirty="0" err="1" smtClean="0"/>
+              <a:t>OpenNI</a:t>
+            </a:r>
+            <a:r>
+              <a:rPr lang="en-US" altLang="ko-KR" dirty="0" smtClean="0"/>
+              <a:t>, Python, VTK, </a:t>
+            </a:r>
+            <a:r>
+              <a:rPr lang="en-US" altLang="ko-KR" dirty="0" err="1" smtClean="0"/>
+              <a:t>Qhull</a:t>
+            </a:r>
+            <a:endParaRPr lang="en-US" altLang="ko-KR" dirty="0" smtClean="0"/>
+          </a:p>
+          <a:p>
             <a:r>
               <a:rPr lang="en-US" altLang="ko-KR" dirty="0" smtClean="0"/>
               <a:t>Using libraries (clients)</a:t>
@@ -17614,7 +18149,7 @@
     </p:spTree>
     <p:extLst>
       <p:ext uri="{BB962C8B-B14F-4D97-AF65-F5344CB8AC3E}">
-        <p14:creationId xmlns:p14="http://schemas.microsoft.com/office/powerpoint/2010/main" val="1348026829"/>
+        <p14:creationId xmlns:p14="http://schemas.microsoft.com/office/powerpoint/2010/main" val="1487896748"/>
       </p:ext>
     </p:extLst>
   </p:cSld>
@@ -17658,7 +18193,7 @@
           <a:p>
             <a:r>
               <a:rPr lang="en-US" altLang="ko-KR" dirty="0" smtClean="0"/>
-              <a:t>FFTW</a:t>
+              <a:t>VTK</a:t>
             </a:r>
             <a:endParaRPr lang="ko-KR" altLang="en-US" dirty="0"/>
           </a:p>
@@ -17714,9 +18249,84 @@
             </a:r>
           </a:p>
           <a:p>
+            <a:pPr lvl="1"/>
+            <a:r>
+              <a:rPr lang="en-US" altLang="ko-KR" dirty="0" smtClean="0"/>
+              <a:t>OpenGL, HDF5, Python, GSL, </a:t>
+            </a:r>
+            <a:r>
+              <a:rPr lang="en-US" altLang="ko-KR" dirty="0" err="1" smtClean="0"/>
+              <a:t>Pthread</a:t>
+            </a:r>
+            <a:r>
+              <a:rPr lang="en-US" altLang="ko-KR" dirty="0" smtClean="0"/>
+              <a:t>, </a:t>
+            </a:r>
+            <a:r>
+              <a:rPr lang="en-US" altLang="ko-KR" dirty="0" err="1" smtClean="0"/>
+              <a:t>Flann</a:t>
+            </a:r>
+            <a:r>
+              <a:rPr lang="en-US" altLang="ko-KR" dirty="0" smtClean="0"/>
+              <a:t>, Boost, {</a:t>
+            </a:r>
+            <a:r>
+              <a:rPr lang="en-US" altLang="ko-KR" dirty="0" err="1" smtClean="0"/>
+              <a:t>FreeType</a:t>
+            </a:r>
+            <a:r>
+              <a:rPr lang="en-US" altLang="ko-KR" dirty="0" smtClean="0"/>
+              <a:t>}, {</a:t>
+            </a:r>
+            <a:r>
+              <a:rPr lang="en-US" altLang="ko-KR" dirty="0" err="1" smtClean="0"/>
+              <a:t>libjpeg</a:t>
+            </a:r>
+            <a:r>
+              <a:rPr lang="en-US" altLang="ko-KR" dirty="0" smtClean="0"/>
+              <a:t>}, {</a:t>
+            </a:r>
+            <a:r>
+              <a:rPr lang="en-US" altLang="ko-KR" dirty="0" err="1" smtClean="0"/>
+              <a:t>libtiff</a:t>
+            </a:r>
+            <a:r>
+              <a:rPr lang="en-US" altLang="ko-KR" dirty="0" smtClean="0"/>
+              <a:t>}, {</a:t>
+            </a:r>
+            <a:r>
+              <a:rPr lang="en-US" altLang="ko-KR" dirty="0" err="1" smtClean="0"/>
+              <a:t>libpng</a:t>
+            </a:r>
+            <a:r>
+              <a:rPr lang="en-US" altLang="ko-KR" dirty="0" smtClean="0"/>
+              <a:t>}, {</a:t>
+            </a:r>
+            <a:r>
+              <a:rPr lang="en-US" altLang="ko-KR" dirty="0" err="1" smtClean="0"/>
+              <a:t>zlib</a:t>
+            </a:r>
+            <a:r>
+              <a:rPr lang="en-US" altLang="ko-KR" dirty="0" smtClean="0"/>
+              <a:t>}, </a:t>
+            </a:r>
+            <a:r>
+              <a:rPr lang="en-US" altLang="ko-KR" dirty="0" err="1" smtClean="0"/>
+              <a:t>GNUplot</a:t>
+            </a:r>
+            <a:endParaRPr lang="en-US" altLang="ko-KR" dirty="0" smtClean="0"/>
+          </a:p>
+          <a:p>
             <a:r>
               <a:rPr lang="en-US" altLang="ko-KR" dirty="0" smtClean="0"/>
               <a:t>Using libraries (clients)</a:t>
+            </a:r>
+          </a:p>
+          <a:p>
+            <a:pPr lvl="1"/>
+            <a:r>
+              <a:rPr lang="en-US" altLang="ko-KR" dirty="0" smtClean="0"/>
+              <a:t>PCL</a:t>
             </a:r>
           </a:p>
           <a:p>
@@ -17731,7 +18341,7 @@
     </p:spTree>
     <p:extLst>
       <p:ext uri="{BB962C8B-B14F-4D97-AF65-F5344CB8AC3E}">
-        <p14:creationId xmlns:p14="http://schemas.microsoft.com/office/powerpoint/2010/main" val="4201026740"/>
+        <p14:creationId xmlns:p14="http://schemas.microsoft.com/office/powerpoint/2010/main" val="1348026829"/>
       </p:ext>
     </p:extLst>
   </p:cSld>
@@ -17774,6 +18384,240 @@
           <a:lstStyle/>
           <a:p>
             <a:r>
+              <a:rPr lang="en-US" altLang="ko-KR" dirty="0" smtClean="0"/>
+              <a:t>ITK</a:t>
+            </a:r>
+            <a:endParaRPr lang="ko-KR" altLang="en-US" dirty="0"/>
+          </a:p>
+        </p:txBody>
+      </p:sp>
+      <p:sp>
+        <p:nvSpPr>
+          <p:cNvPr id="4" name="내용 개체 틀 3"/>
+          <p:cNvSpPr>
+            <a:spLocks noGrp="1"/>
+          </p:cNvSpPr>
+          <p:nvPr>
+            <p:ph idx="1"/>
+          </p:nvPr>
+        </p:nvSpPr>
+        <p:spPr/>
+        <p:txBody>
+          <a:bodyPr>
+            <a:normAutofit/>
+          </a:bodyPr>
+          <a:lstStyle/>
+          <a:p>
+            <a:r>
+              <a:rPr lang="en-US" altLang="ko-KR" dirty="0"/>
+              <a:t>Settings</a:t>
+            </a:r>
+          </a:p>
+          <a:p>
+            <a:pPr lvl="1"/>
+            <a:r>
+              <a:rPr lang="en-US" altLang="ko-KR" dirty="0"/>
+              <a:t>Link mode: Shared / Static</a:t>
+            </a:r>
+          </a:p>
+          <a:p>
+            <a:pPr lvl="1"/>
+            <a:r>
+              <a:rPr lang="en-US" altLang="ko-KR" dirty="0"/>
+              <a:t>Build mode: Release / Debug</a:t>
+            </a:r>
+          </a:p>
+          <a:p>
+            <a:pPr lvl="1"/>
+            <a:r>
+              <a:rPr lang="en-US" altLang="ko-KR" dirty="0"/>
+              <a:t>Platform: x32 / x64</a:t>
+            </a:r>
+          </a:p>
+          <a:p>
+            <a:r>
+              <a:rPr lang="en-US" altLang="ko-KR" dirty="0" smtClean="0"/>
+              <a:t>Dependent libraries (suppliers)</a:t>
+            </a:r>
+          </a:p>
+          <a:p>
+            <a:r>
+              <a:rPr lang="en-US" altLang="ko-KR" dirty="0" smtClean="0"/>
+              <a:t>Using libraries (clients)</a:t>
+            </a:r>
+          </a:p>
+          <a:p>
+            <a:r>
+              <a:rPr lang="en-US" altLang="ko-KR" dirty="0" smtClean="0"/>
+              <a:t>Building tips</a:t>
+            </a:r>
+            <a:endParaRPr lang="ko-KR" altLang="en-US" dirty="0"/>
+          </a:p>
+        </p:txBody>
+      </p:sp>
+    </p:spTree>
+    <p:extLst>
+      <p:ext uri="{BB962C8B-B14F-4D97-AF65-F5344CB8AC3E}">
+        <p14:creationId xmlns:p14="http://schemas.microsoft.com/office/powerpoint/2010/main" val="1348026829"/>
+      </p:ext>
+    </p:extLst>
+  </p:cSld>
+  <p:clrMapOvr>
+    <a:masterClrMapping/>
+  </p:clrMapOvr>
+</p:sld>
+</file>
+
+<file path=ppt/slides/slide34.xml><?xml version="1.0" encoding="utf-8"?>
+<p:sld xmlns:a="http://schemas.openxmlformats.org/drawingml/2006/main" xmlns:r="http://schemas.openxmlformats.org/officeDocument/2006/relationships" xmlns:p="http://schemas.openxmlformats.org/presentationml/2006/main">
+  <p:cSld>
+    <p:spTree>
+      <p:nvGrpSpPr>
+        <p:cNvPr id="1" name=""/>
+        <p:cNvGrpSpPr/>
+        <p:nvPr/>
+      </p:nvGrpSpPr>
+      <p:grpSpPr>
+        <a:xfrm>
+          <a:off x="0" y="0"/>
+          <a:ext cx="0" cy="0"/>
+          <a:chOff x="0" y="0"/>
+          <a:chExt cx="0" cy="0"/>
+        </a:xfrm>
+      </p:grpSpPr>
+      <p:sp>
+        <p:nvSpPr>
+          <p:cNvPr id="3" name="제목 2"/>
+          <p:cNvSpPr>
+            <a:spLocks noGrp="1"/>
+          </p:cNvSpPr>
+          <p:nvPr>
+            <p:ph type="title"/>
+          </p:nvPr>
+        </p:nvSpPr>
+        <p:spPr/>
+        <p:txBody>
+          <a:bodyPr/>
+          <a:lstStyle/>
+          <a:p>
+            <a:r>
+              <a:rPr lang="en-US" altLang="ko-KR" dirty="0" smtClean="0"/>
+              <a:t>FFTW</a:t>
+            </a:r>
+            <a:endParaRPr lang="ko-KR" altLang="en-US" dirty="0"/>
+          </a:p>
+        </p:txBody>
+      </p:sp>
+      <p:sp>
+        <p:nvSpPr>
+          <p:cNvPr id="4" name="내용 개체 틀 3"/>
+          <p:cNvSpPr>
+            <a:spLocks noGrp="1"/>
+          </p:cNvSpPr>
+          <p:nvPr>
+            <p:ph idx="1"/>
+          </p:nvPr>
+        </p:nvSpPr>
+        <p:spPr/>
+        <p:txBody>
+          <a:bodyPr>
+            <a:normAutofit/>
+          </a:bodyPr>
+          <a:lstStyle/>
+          <a:p>
+            <a:r>
+              <a:rPr lang="en-US" altLang="ko-KR" dirty="0"/>
+              <a:t>Settings</a:t>
+            </a:r>
+          </a:p>
+          <a:p>
+            <a:pPr lvl="1"/>
+            <a:r>
+              <a:rPr lang="en-US" altLang="ko-KR" dirty="0"/>
+              <a:t>Link mode: Shared / Static</a:t>
+            </a:r>
+          </a:p>
+          <a:p>
+            <a:pPr lvl="1"/>
+            <a:r>
+              <a:rPr lang="en-US" altLang="ko-KR" dirty="0"/>
+              <a:t>Build mode: Release / Debug</a:t>
+            </a:r>
+          </a:p>
+          <a:p>
+            <a:pPr lvl="1"/>
+            <a:r>
+              <a:rPr lang="en-US" altLang="ko-KR" dirty="0"/>
+              <a:t>Platform: x32 / x64</a:t>
+            </a:r>
+          </a:p>
+          <a:p>
+            <a:r>
+              <a:rPr lang="en-US" altLang="ko-KR" dirty="0" smtClean="0"/>
+              <a:t>Dependent libraries (suppliers)</a:t>
+            </a:r>
+          </a:p>
+          <a:p>
+            <a:r>
+              <a:rPr lang="en-US" altLang="ko-KR" dirty="0" smtClean="0"/>
+              <a:t>Using libraries (clients)</a:t>
+            </a:r>
+          </a:p>
+          <a:p>
+            <a:r>
+              <a:rPr lang="en-US" altLang="ko-KR" dirty="0" smtClean="0"/>
+              <a:t>Building tips</a:t>
+            </a:r>
+            <a:endParaRPr lang="ko-KR" altLang="en-US" dirty="0"/>
+          </a:p>
+        </p:txBody>
+      </p:sp>
+    </p:spTree>
+    <p:extLst>
+      <p:ext uri="{BB962C8B-B14F-4D97-AF65-F5344CB8AC3E}">
+        <p14:creationId xmlns:p14="http://schemas.microsoft.com/office/powerpoint/2010/main" val="4201026740"/>
+      </p:ext>
+    </p:extLst>
+  </p:cSld>
+  <p:clrMapOvr>
+    <a:masterClrMapping/>
+  </p:clrMapOvr>
+</p:sld>
+</file>
+
+<file path=ppt/slides/slide35.xml><?xml version="1.0" encoding="utf-8"?>
+<p:sld xmlns:a="http://schemas.openxmlformats.org/drawingml/2006/main" xmlns:r="http://schemas.openxmlformats.org/officeDocument/2006/relationships" xmlns:p="http://schemas.openxmlformats.org/presentationml/2006/main">
+  <p:cSld>
+    <p:spTree>
+      <p:nvGrpSpPr>
+        <p:cNvPr id="1" name=""/>
+        <p:cNvGrpSpPr/>
+        <p:nvPr/>
+      </p:nvGrpSpPr>
+      <p:grpSpPr>
+        <a:xfrm>
+          <a:off x="0" y="0"/>
+          <a:ext cx="0" cy="0"/>
+          <a:chOff x="0" y="0"/>
+          <a:chExt cx="0" cy="0"/>
+        </a:xfrm>
+      </p:grpSpPr>
+      <p:sp>
+        <p:nvSpPr>
+          <p:cNvPr id="3" name="제목 2"/>
+          <p:cNvSpPr>
+            <a:spLocks noGrp="1"/>
+          </p:cNvSpPr>
+          <p:nvPr>
+            <p:ph type="title"/>
+          </p:nvPr>
+        </p:nvSpPr>
+        <p:spPr/>
+        <p:txBody>
+          <a:bodyPr/>
+          <a:lstStyle/>
+          <a:p>
+            <a:r>
               <a:rPr lang="en-US" altLang="ko-KR" dirty="0" err="1" smtClean="0"/>
               <a:t>OpenCV</a:t>
             </a:r>
@@ -17878,7 +18722,7 @@
             </a:r>
             <a:r>
               <a:rPr lang="en-US" altLang="ko-KR" dirty="0" smtClean="0"/>
-              <a:t>, </a:t>
+              <a:t>, {</a:t>
             </a:r>
             <a:r>
               <a:rPr lang="en-US" altLang="ko-KR" dirty="0" err="1" smtClean="0"/>
@@ -17886,7 +18730,7 @@
             </a:r>
             <a:r>
               <a:rPr lang="en-US" altLang="ko-KR" dirty="0" smtClean="0"/>
-              <a:t>, Python, CUDA, </a:t>
+              <a:t>}, Python, CUDA, {</a:t>
             </a:r>
             <a:r>
               <a:rPr lang="en-US" altLang="ko-KR" dirty="0" err="1" smtClean="0"/>
@@ -17894,13 +18738,8 @@
             </a:r>
             <a:r>
               <a:rPr lang="en-US" altLang="ko-KR" dirty="0" smtClean="0"/>
-              <a:t>, </a:t>
-            </a:r>
-            <a:r>
-              <a:rPr lang="en-US" altLang="ko-KR" dirty="0"/>
-              <a:t>IPP</a:t>
-            </a:r>
-            <a:endParaRPr lang="en-US" altLang="ko-KR" dirty="0" smtClean="0"/>
+              <a:t>}, {IPP}</a:t>
+            </a:r>
           </a:p>
           <a:p>
             <a:r>
@@ -17917,62 +18756,122 @@
           <a:p>
             <a:pPr lvl="1"/>
             <a:r>
-              <a:rPr lang="en-US" altLang="ko-KR" dirty="0" err="1" smtClean="0"/>
+              <a:rPr lang="en-US" altLang="ko-KR" dirty="0" err="1" smtClean="0">
+                <a:solidFill>
+                  <a:srgbClr val="0000FF"/>
+                </a:solidFill>
+              </a:rPr>
               <a:t>OpenEXR</a:t>
             </a:r>
             <a:r>
-              <a:rPr lang="ko-KR" altLang="en-US" dirty="0"/>
+              <a:rPr lang="ko-KR" altLang="en-US" dirty="0">
+                <a:solidFill>
+                  <a:srgbClr val="0000FF"/>
+                </a:solidFill>
+              </a:rPr>
               <a:t> 를 </a:t>
             </a:r>
             <a:r>
-              <a:rPr lang="en-US" altLang="ko-KR" dirty="0"/>
+              <a:rPr lang="en-US" altLang="ko-KR" dirty="0">
+                <a:solidFill>
+                  <a:srgbClr val="0000FF"/>
+                </a:solidFill>
+              </a:rPr>
               <a:t>shared library</a:t>
             </a:r>
             <a:r>
-              <a:rPr lang="ko-KR" altLang="en-US" dirty="0"/>
+              <a:rPr lang="ko-KR" altLang="en-US" dirty="0">
+                <a:solidFill>
+                  <a:srgbClr val="0000FF"/>
+                </a:solidFill>
+              </a:rPr>
               <a:t> </a:t>
             </a:r>
             <a:r>
-              <a:rPr lang="en-US" altLang="ko-KR" dirty="0"/>
+              <a:rPr lang="en-US" altLang="ko-KR" dirty="0">
+                <a:solidFill>
+                  <a:srgbClr val="0000FF"/>
+                </a:solidFill>
+              </a:rPr>
               <a:t>linking</a:t>
             </a:r>
             <a:r>
-              <a:rPr lang="ko-KR" altLang="en-US" dirty="0"/>
+              <a:rPr lang="ko-KR" altLang="en-US" dirty="0">
+                <a:solidFill>
+                  <a:srgbClr val="0000FF"/>
+                </a:solidFill>
+              </a:rPr>
               <a:t>하기 위해서 </a:t>
             </a:r>
             <a:r>
-              <a:rPr lang="en-US" altLang="ko-KR" dirty="0"/>
+              <a:rPr lang="en-US" altLang="ko-KR" dirty="0">
+                <a:solidFill>
+                  <a:srgbClr val="0000FF"/>
+                </a:solidFill>
+              </a:rPr>
               <a:t>OPENEXR_DLL</a:t>
             </a:r>
             <a:r>
-              <a:rPr lang="ko-KR" altLang="en-US" dirty="0" smtClean="0"/>
+              <a:rPr lang="ko-KR" altLang="en-US" dirty="0" smtClean="0">
+                <a:solidFill>
+                  <a:srgbClr val="0000FF"/>
+                </a:solidFill>
+              </a:rPr>
               <a:t> </a:t>
             </a:r>
             <a:r>
-              <a:rPr lang="en-US" altLang="ko-KR" dirty="0"/>
+              <a:rPr lang="en-US" altLang="ko-KR" dirty="0">
+                <a:solidFill>
+                  <a:srgbClr val="0000FF"/>
+                </a:solidFill>
+              </a:rPr>
               <a:t>macro</a:t>
             </a:r>
             <a:r>
-              <a:rPr lang="ko-KR" altLang="en-US" dirty="0" smtClean="0"/>
+              <a:rPr lang="ko-KR" altLang="en-US" dirty="0" smtClean="0">
+                <a:solidFill>
+                  <a:srgbClr val="0000FF"/>
+                </a:solidFill>
+              </a:rPr>
               <a:t>를 </a:t>
             </a:r>
             <a:r>
-              <a:rPr lang="en-US" altLang="ko-KR" dirty="0" err="1" smtClean="0"/>
+              <a:rPr lang="en-US" altLang="ko-KR" dirty="0" err="1" smtClean="0">
+                <a:solidFill>
+                  <a:srgbClr val="0000FF"/>
+                </a:solidFill>
+              </a:rPr>
               <a:t>highgui</a:t>
             </a:r>
             <a:r>
-              <a:rPr lang="en-US" altLang="ko-KR" dirty="0" smtClean="0"/>
+              <a:rPr lang="en-US" altLang="ko-KR" dirty="0" smtClean="0">
+                <a:solidFill>
+                  <a:srgbClr val="0000FF"/>
+                </a:solidFill>
+              </a:rPr>
               <a:t> project</a:t>
             </a:r>
             <a:r>
-              <a:rPr lang="ko-KR" altLang="en-US" dirty="0" smtClean="0"/>
+              <a:rPr lang="ko-KR" altLang="en-US" dirty="0" smtClean="0">
+                <a:solidFill>
+                  <a:srgbClr val="0000FF"/>
+                </a:solidFill>
+              </a:rPr>
               <a:t>에 정의하여야 한다</a:t>
             </a:r>
             <a:r>
-              <a:rPr lang="en-US" altLang="ko-KR" smtClean="0"/>
+              <a:rPr lang="en-US" altLang="ko-KR" dirty="0" smtClean="0">
+                <a:solidFill>
+                  <a:srgbClr val="0000FF"/>
+                </a:solidFill>
+              </a:rPr>
               <a:t>.</a:t>
             </a:r>
-            <a:endParaRPr lang="en-US" altLang="ko-KR" dirty="0"/>
+            <a:endParaRPr lang="en-US" altLang="ko-KR" dirty="0">
+              <a:solidFill>
+                <a:srgbClr val="0000FF"/>
+              </a:solidFill>
+            </a:endParaRPr>
           </a:p>
         </p:txBody>
       </p:sp>
@@ -17989,7 +18888,287 @@
 </p:sld>
 </file>
 
-<file path=ppt/slides/slide34.xml><?xml version="1.0" encoding="utf-8"?>
+<file path=ppt/slides/slide36.xml><?xml version="1.0" encoding="utf-8"?>
+<p:sld xmlns:a="http://schemas.openxmlformats.org/drawingml/2006/main" xmlns:r="http://schemas.openxmlformats.org/officeDocument/2006/relationships" xmlns:p="http://schemas.openxmlformats.org/presentationml/2006/main">
+  <p:cSld>
+    <p:spTree>
+      <p:nvGrpSpPr>
+        <p:cNvPr id="1" name=""/>
+        <p:cNvGrpSpPr/>
+        <p:nvPr/>
+      </p:nvGrpSpPr>
+      <p:grpSpPr>
+        <a:xfrm>
+          <a:off x="0" y="0"/>
+          <a:ext cx="0" cy="0"/>
+          <a:chOff x="0" y="0"/>
+          <a:chExt cx="0" cy="0"/>
+        </a:xfrm>
+      </p:grpSpPr>
+      <p:sp>
+        <p:nvSpPr>
+          <p:cNvPr id="3" name="제목 2"/>
+          <p:cNvSpPr>
+            <a:spLocks noGrp="1"/>
+          </p:cNvSpPr>
+          <p:nvPr>
+            <p:ph type="title"/>
+          </p:nvPr>
+        </p:nvSpPr>
+        <p:spPr/>
+        <p:txBody>
+          <a:bodyPr/>
+          <a:lstStyle/>
+          <a:p>
+            <a:r>
+              <a:rPr lang="en-US" altLang="ko-KR" dirty="0" err="1" smtClean="0"/>
+              <a:t>VxL</a:t>
+            </a:r>
+            <a:endParaRPr lang="ko-KR" altLang="en-US" dirty="0"/>
+          </a:p>
+        </p:txBody>
+      </p:sp>
+      <p:sp>
+        <p:nvSpPr>
+          <p:cNvPr id="4" name="내용 개체 틀 3"/>
+          <p:cNvSpPr>
+            <a:spLocks noGrp="1"/>
+          </p:cNvSpPr>
+          <p:nvPr>
+            <p:ph idx="1"/>
+          </p:nvPr>
+        </p:nvSpPr>
+        <p:spPr/>
+        <p:txBody>
+          <a:bodyPr>
+            <a:normAutofit fontScale="85000" lnSpcReduction="20000"/>
+          </a:bodyPr>
+          <a:lstStyle/>
+          <a:p>
+            <a:r>
+              <a:rPr lang="en-US" altLang="ko-KR" dirty="0"/>
+              <a:t>Settings</a:t>
+            </a:r>
+          </a:p>
+          <a:p>
+            <a:pPr lvl="1"/>
+            <a:r>
+              <a:rPr lang="en-US" altLang="ko-KR" dirty="0"/>
+              <a:t>Link mode: </a:t>
+            </a:r>
+            <a:r>
+              <a:rPr lang="en-US" altLang="ko-KR" dirty="0" smtClean="0"/>
+              <a:t>Static</a:t>
+            </a:r>
+            <a:endParaRPr lang="en-US" altLang="ko-KR" dirty="0"/>
+          </a:p>
+          <a:p>
+            <a:pPr lvl="1"/>
+            <a:r>
+              <a:rPr lang="en-US" altLang="ko-KR" dirty="0"/>
+              <a:t>Build mode: Release / Debug</a:t>
+            </a:r>
+          </a:p>
+          <a:p>
+            <a:pPr lvl="1"/>
+            <a:r>
+              <a:rPr lang="en-US" altLang="ko-KR" dirty="0"/>
+              <a:t>Platform: x32 / x64</a:t>
+            </a:r>
+          </a:p>
+          <a:p>
+            <a:r>
+              <a:rPr lang="en-US" altLang="ko-KR" dirty="0" smtClean="0"/>
+              <a:t>Dependent libraries (suppliers)</a:t>
+            </a:r>
+          </a:p>
+          <a:p>
+            <a:pPr lvl="1"/>
+            <a:r>
+              <a:rPr lang="en-US" altLang="ko-KR" dirty="0" smtClean="0"/>
+              <a:t>Python, OpenGL, {jpeg}, {</a:t>
+            </a:r>
+            <a:r>
+              <a:rPr lang="en-US" altLang="ko-KR" dirty="0" err="1" smtClean="0"/>
+              <a:t>png</a:t>
+            </a:r>
+            <a:r>
+              <a:rPr lang="en-US" altLang="ko-KR" dirty="0" smtClean="0"/>
+              <a:t>}, {tiff}, {</a:t>
+            </a:r>
+            <a:r>
+              <a:rPr lang="en-US" altLang="ko-KR" dirty="0" err="1" smtClean="0"/>
+              <a:t>zlib</a:t>
+            </a:r>
+            <a:r>
+              <a:rPr lang="en-US" altLang="ko-KR" dirty="0" smtClean="0"/>
+              <a:t>}, {</a:t>
+            </a:r>
+            <a:r>
+              <a:rPr lang="en-US" altLang="ko-KR" dirty="0" err="1" smtClean="0"/>
+              <a:t>ffmpeg</a:t>
+            </a:r>
+            <a:r>
+              <a:rPr lang="en-US" altLang="ko-KR" dirty="0" smtClean="0"/>
+              <a:t>}, {expat}, {</a:t>
+            </a:r>
+            <a:r>
+              <a:rPr lang="en-US" altLang="ko-KR" dirty="0" err="1" smtClean="0"/>
+              <a:t>xerces</a:t>
+            </a:r>
+            <a:r>
+              <a:rPr lang="en-US" altLang="ko-KR" dirty="0" smtClean="0"/>
+              <a:t>}, {</a:t>
+            </a:r>
+            <a:r>
+              <a:rPr lang="en-US" altLang="ko-KR" dirty="0" err="1" smtClean="0"/>
+              <a:t>wxWidgets</a:t>
+            </a:r>
+            <a:r>
+              <a:rPr lang="en-US" altLang="ko-KR" dirty="0" smtClean="0"/>
+              <a:t>}, {SLURM}</a:t>
+            </a:r>
+          </a:p>
+          <a:p>
+            <a:r>
+              <a:rPr lang="en-US" altLang="ko-KR" dirty="0" smtClean="0"/>
+              <a:t>Using libraries (clients)</a:t>
+            </a:r>
+          </a:p>
+          <a:p>
+            <a:r>
+              <a:rPr lang="en-US" altLang="ko-KR" dirty="0" smtClean="0"/>
+              <a:t>Building tips</a:t>
+            </a:r>
+          </a:p>
+          <a:p>
+            <a:pPr lvl="1"/>
+            <a:r>
+              <a:rPr lang="en-US" altLang="ko-KR" dirty="0" smtClean="0"/>
+              <a:t>CMAKE_CXX_FLAGS &amp; CMAKE_C_FLAGS</a:t>
+            </a:r>
+            <a:r>
+              <a:rPr lang="ko-KR" altLang="en-US" dirty="0" smtClean="0"/>
+              <a:t>에 </a:t>
+            </a:r>
+            <a:r>
+              <a:rPr lang="en-US" altLang="ko-KR" dirty="0"/>
+              <a:t> HAS_FFMPEG_SEVERAL &amp; FFMPEG_FOUND_SEVERAL</a:t>
+            </a:r>
+            <a:r>
+              <a:rPr lang="ko-KR" altLang="en-US" dirty="0" smtClean="0"/>
+              <a:t>를</a:t>
+            </a:r>
+            <a:r>
+              <a:rPr lang="en-US" altLang="ko-KR" dirty="0" smtClean="0"/>
+              <a:t> </a:t>
+            </a:r>
+            <a:r>
+              <a:rPr lang="ko-KR" altLang="en-US" dirty="0" smtClean="0"/>
+              <a:t>정의</a:t>
+            </a:r>
+            <a:r>
+              <a:rPr lang="en-US" altLang="ko-KR" dirty="0" smtClean="0"/>
+              <a:t>.</a:t>
+            </a:r>
+          </a:p>
+          <a:p>
+            <a:pPr lvl="2"/>
+            <a:r>
+              <a:rPr lang="en-US" altLang="ko-KR" dirty="0" err="1" smtClean="0"/>
+              <a:t>FFmpeg</a:t>
+            </a:r>
+            <a:r>
+              <a:rPr lang="en-US" altLang="ko-KR" dirty="0" smtClean="0"/>
+              <a:t> library</a:t>
+            </a:r>
+            <a:r>
+              <a:rPr lang="ko-KR" altLang="en-US" dirty="0" smtClean="0"/>
+              <a:t>의 </a:t>
+            </a:r>
+            <a:r>
+              <a:rPr lang="en-US" altLang="ko-KR" dirty="0" smtClean="0"/>
+              <a:t>header</a:t>
+            </a:r>
+            <a:r>
+              <a:rPr lang="ko-KR" altLang="en-US" dirty="0" smtClean="0"/>
+              <a:t>가 </a:t>
+            </a:r>
+            <a:r>
+              <a:rPr lang="en-US" altLang="ko-KR" dirty="0" smtClean="0"/>
+              <a:t>sub-directory</a:t>
+            </a:r>
+            <a:r>
+              <a:rPr lang="ko-KR" altLang="en-US" dirty="0" smtClean="0"/>
+              <a:t>를 가지는 구조이므로</a:t>
+            </a:r>
+            <a:r>
+              <a:rPr lang="en-US" altLang="ko-KR" dirty="0" smtClean="0"/>
+              <a:t>.</a:t>
+            </a:r>
+          </a:p>
+          <a:p>
+            <a:pPr lvl="1"/>
+            <a:r>
+              <a:rPr lang="en-US" altLang="ko-KR" dirty="0" smtClean="0"/>
+              <a:t>VNL_CONFIG_ENABLE_SSE2</a:t>
+            </a:r>
+            <a:r>
+              <a:rPr lang="ko-KR" altLang="en-US" dirty="0" smtClean="0"/>
+              <a:t>는 </a:t>
+            </a:r>
+            <a:r>
+              <a:rPr lang="en-US" altLang="ko-KR" dirty="0" smtClean="0"/>
+              <a:t>disable</a:t>
+            </a:r>
+            <a:r>
+              <a:rPr lang="ko-KR" altLang="en-US" dirty="0" smtClean="0"/>
+              <a:t>되어야 함</a:t>
+            </a:r>
+            <a:r>
+              <a:rPr lang="en-US" altLang="ko-KR" dirty="0" smtClean="0"/>
+              <a:t>.</a:t>
+            </a:r>
+          </a:p>
+          <a:p>
+            <a:pPr lvl="1"/>
+            <a:r>
+              <a:rPr lang="en-US" altLang="ko-KR" dirty="0" smtClean="0"/>
+              <a:t>Static library</a:t>
+            </a:r>
+            <a:r>
+              <a:rPr lang="ko-KR" altLang="en-US" dirty="0" smtClean="0"/>
+              <a:t>로 </a:t>
+            </a:r>
+            <a:r>
+              <a:rPr lang="en-US" altLang="ko-KR" dirty="0" smtClean="0"/>
+              <a:t>building</a:t>
+            </a:r>
+            <a:r>
+              <a:rPr lang="ko-KR" altLang="en-US" dirty="0" smtClean="0"/>
+              <a:t>해야 함</a:t>
+            </a:r>
+            <a:r>
+              <a:rPr lang="en-US" altLang="ko-KR" dirty="0" smtClean="0"/>
+              <a:t>.</a:t>
+            </a:r>
+          </a:p>
+        </p:txBody>
+      </p:sp>
+    </p:spTree>
+    <p:extLst>
+      <p:ext uri="{BB962C8B-B14F-4D97-AF65-F5344CB8AC3E}">
+        <p14:creationId xmlns:p14="http://schemas.microsoft.com/office/powerpoint/2010/main" val="1233773622"/>
+      </p:ext>
+    </p:extLst>
+  </p:cSld>
+  <p:clrMapOvr>
+    <a:masterClrMapping/>
+  </p:clrMapOvr>
+</p:sld>
+</file>
+
+<file path=ppt/slides/slide37.xml><?xml version="1.0" encoding="utf-8"?>
 <p:sld xmlns:a="http://schemas.openxmlformats.org/drawingml/2006/main" xmlns:r="http://schemas.openxmlformats.org/officeDocument/2006/relationships" xmlns:p="http://schemas.openxmlformats.org/presentationml/2006/main">
   <p:cSld>
     <p:spTree>
@@ -21849,13 +23028,13 @@
       </p:grpSp>
       <p:grpSp>
         <p:nvGrpSpPr>
-          <p:cNvPr id="148" name="그룹 147"/>
+          <p:cNvPr id="78" name="그룹 77"/>
           <p:cNvGrpSpPr/>
           <p:nvPr/>
         </p:nvGrpSpPr>
         <p:grpSpPr>
           <a:xfrm>
-            <a:off x="4922326" y="2280454"/>
+            <a:off x="6871399" y="2280454"/>
             <a:ext cx="1440160" cy="500701"/>
             <a:chOff x="3059832" y="2280454"/>
             <a:chExt cx="1440160" cy="500701"/>
@@ -21863,7 +23042,7 @@
         </p:grpSpPr>
         <p:sp>
           <p:nvSpPr>
-            <p:cNvPr id="149" name="직사각형 148"/>
+            <p:cNvPr id="79" name="직사각형 78"/>
             <p:cNvSpPr/>
             <p:nvPr/>
           </p:nvSpPr>
@@ -21912,7 +23091,7 @@
         </p:sp>
         <p:sp>
           <p:nvSpPr>
-            <p:cNvPr id="150" name="직사각형 149"/>
+            <p:cNvPr id="80" name="직사각형 79"/>
             <p:cNvSpPr/>
             <p:nvPr/>
           </p:nvSpPr>
@@ -21982,7 +23161,7 @@
         </p:sp>
         <p:sp>
           <p:nvSpPr>
-            <p:cNvPr id="151" name="직사각형 150"/>
+            <p:cNvPr id="81" name="직사각형 80"/>
             <p:cNvSpPr/>
             <p:nvPr/>
           </p:nvSpPr>
@@ -22052,7 +23231,7 @@
         </p:sp>
         <p:sp>
           <p:nvSpPr>
-            <p:cNvPr id="152" name="직사각형 151"/>
+            <p:cNvPr id="82" name="직사각형 81"/>
             <p:cNvSpPr/>
             <p:nvPr/>
           </p:nvSpPr>
@@ -22132,7 +23311,7 @@
         </p:sp>
         <p:sp>
           <p:nvSpPr>
-            <p:cNvPr id="153" name="직사각형 152"/>
+            <p:cNvPr id="83" name="직사각형 82"/>
             <p:cNvSpPr/>
             <p:nvPr/>
           </p:nvSpPr>
@@ -22204,6 +23383,349 @@
                     <a:lumMod val="75000"/>
                   </a:schemeClr>
                 </a:solidFill>
+                <a:effectLst/>
+                <a:latin typeface="Arial" charset="0"/>
+              </a:endParaRPr>
+            </a:p>
+          </p:txBody>
+        </p:sp>
+      </p:grpSp>
+      <p:grpSp>
+        <p:nvGrpSpPr>
+          <p:cNvPr id="84" name="그룹 83"/>
+          <p:cNvGrpSpPr/>
+          <p:nvPr/>
+        </p:nvGrpSpPr>
+        <p:grpSpPr>
+          <a:xfrm>
+            <a:off x="4922326" y="2280454"/>
+            <a:ext cx="1440160" cy="500701"/>
+            <a:chOff x="904449" y="2280454"/>
+            <a:chExt cx="1440160" cy="500701"/>
+          </a:xfrm>
+        </p:grpSpPr>
+        <p:sp>
+          <p:nvSpPr>
+            <p:cNvPr id="85" name="직사각형 84"/>
+            <p:cNvSpPr/>
+            <p:nvPr/>
+          </p:nvSpPr>
+          <p:spPr bwMode="auto">
+            <a:xfrm>
+              <a:off x="904449" y="2280454"/>
+              <a:ext cx="1440160" cy="500701"/>
+            </a:xfrm>
+            <a:prstGeom prst="rect">
+              <a:avLst/>
+            </a:prstGeom>
+            <a:noFill/>
+            <a:ln w="9525" cap="flat" cmpd="sng" algn="ctr">
+              <a:solidFill>
+                <a:schemeClr val="tx1"/>
+              </a:solidFill>
+              <a:prstDash val="solid"/>
+              <a:round/>
+              <a:headEnd type="none" w="med" len="med"/>
+              <a:tailEnd type="none" w="med" len="med"/>
+            </a:ln>
+            <a:effectLst/>
+          </p:spPr>
+          <p:txBody>
+            <a:bodyPr vert="horz" wrap="square" lIns="91440" tIns="45720" rIns="91440" bIns="45720" numCol="1" rtlCol="0" anchor="t" anchorCtr="1" compatLnSpc="1">
+              <a:prstTxWarp prst="textNoShape">
+                <a:avLst/>
+              </a:prstTxWarp>
+            </a:bodyPr>
+            <a:lstStyle/>
+            <a:p>
+              <a:pPr algn="ctr"/>
+              <a:r>
+                <a:rPr lang="en-US" altLang="ko-KR" sz="1600" dirty="0" err="1" smtClean="0"/>
+                <a:t>ImageMagick</a:t>
+              </a:r>
+              <a:endParaRPr kumimoji="0" lang="ko-KR" altLang="en-US" sz="1600" b="0" i="0" u="none" strike="noStrike" cap="none" normalizeH="0" baseline="0" dirty="0" smtClean="0">
+                <a:ln>
+                  <a:noFill/>
+                </a:ln>
+                <a:effectLst/>
+              </a:endParaRPr>
+            </a:p>
+          </p:txBody>
+        </p:sp>
+        <p:sp>
+          <p:nvSpPr>
+            <p:cNvPr id="86" name="직사각형 85"/>
+            <p:cNvSpPr/>
+            <p:nvPr/>
+          </p:nvSpPr>
+          <p:spPr bwMode="auto">
+            <a:xfrm>
+              <a:off x="904449" y="2637026"/>
+              <a:ext cx="360040" cy="144016"/>
+            </a:xfrm>
+            <a:prstGeom prst="rect">
+              <a:avLst/>
+            </a:prstGeom>
+            <a:noFill/>
+            <a:ln w="9525" cap="flat" cmpd="sng" algn="ctr">
+              <a:solidFill>
+                <a:schemeClr val="tx1"/>
+              </a:solidFill>
+              <a:prstDash val="solid"/>
+              <a:round/>
+              <a:headEnd type="none" w="med" len="med"/>
+              <a:tailEnd type="none" w="med" len="med"/>
+            </a:ln>
+            <a:effectLst/>
+          </p:spPr>
+          <p:txBody>
+            <a:bodyPr vert="horz" wrap="square" lIns="91440" tIns="45720" rIns="91440" bIns="45720" numCol="1" rtlCol="0" anchor="ctr" anchorCtr="1" compatLnSpc="1">
+              <a:prstTxWarp prst="textNoShape">
+                <a:avLst/>
+              </a:prstTxWarp>
+            </a:bodyPr>
+            <a:lstStyle/>
+            <a:p>
+              <a:pPr marL="0" marR="0" indent="0" algn="ctr" defTabSz="914400" rtl="0" eaLnBrk="1" fontAlgn="base" latinLnBrk="0" hangingPunct="1">
+                <a:lnSpc>
+                  <a:spcPct val="100000"/>
+                </a:lnSpc>
+                <a:spcBef>
+                  <a:spcPct val="0"/>
+                </a:spcBef>
+                <a:spcAft>
+                  <a:spcPct val="0"/>
+                </a:spcAft>
+                <a:buClrTx/>
+                <a:buSzTx/>
+                <a:buFontTx/>
+                <a:buNone/>
+                <a:tabLst/>
+              </a:pPr>
+              <a:r>
+                <a:rPr kumimoji="0" lang="en-US" altLang="ko-KR" sz="700" b="0" i="0" u="none" strike="noStrike" cap="none" normalizeH="0" baseline="0" dirty="0" smtClean="0">
+                  <a:ln>
+                    <a:noFill/>
+                  </a:ln>
+                  <a:effectLst/>
+                  <a:latin typeface="Arial" charset="0"/>
+                </a:rPr>
+                <a:t>SO</a:t>
+              </a:r>
+              <a:endParaRPr kumimoji="0" lang="ko-KR" altLang="en-US" sz="700" b="0" i="0" u="none" strike="noStrike" cap="none" normalizeH="0" baseline="0" dirty="0" smtClean="0">
+                <a:ln>
+                  <a:noFill/>
+                </a:ln>
+                <a:effectLst/>
+                <a:latin typeface="Arial" charset="0"/>
+              </a:endParaRPr>
+            </a:p>
+          </p:txBody>
+        </p:sp>
+        <p:sp>
+          <p:nvSpPr>
+            <p:cNvPr id="87" name="직사각형 86"/>
+            <p:cNvSpPr/>
+            <p:nvPr/>
+          </p:nvSpPr>
+          <p:spPr bwMode="auto">
+            <a:xfrm>
+              <a:off x="1624529" y="2637139"/>
+              <a:ext cx="360040" cy="144016"/>
+            </a:xfrm>
+            <a:prstGeom prst="rect">
+              <a:avLst/>
+            </a:prstGeom>
+            <a:noFill/>
+            <a:ln w="9525" cap="flat" cmpd="sng" algn="ctr">
+              <a:solidFill>
+                <a:schemeClr val="tx1"/>
+              </a:solidFill>
+              <a:prstDash val="solid"/>
+              <a:round/>
+              <a:headEnd type="none" w="med" len="med"/>
+              <a:tailEnd type="none" w="med" len="med"/>
+            </a:ln>
+            <a:effectLst/>
+          </p:spPr>
+          <p:txBody>
+            <a:bodyPr vert="horz" wrap="square" lIns="91440" tIns="45720" rIns="91440" bIns="45720" numCol="1" rtlCol="0" anchor="ctr" anchorCtr="1" compatLnSpc="1">
+              <a:prstTxWarp prst="textNoShape">
+                <a:avLst/>
+              </a:prstTxWarp>
+            </a:bodyPr>
+            <a:lstStyle/>
+            <a:p>
+              <a:pPr marL="0" marR="0" indent="0" algn="ctr" defTabSz="914400" rtl="0" eaLnBrk="1" fontAlgn="base" latinLnBrk="0" hangingPunct="1">
+                <a:lnSpc>
+                  <a:spcPct val="100000"/>
+                </a:lnSpc>
+                <a:spcBef>
+                  <a:spcPct val="0"/>
+                </a:spcBef>
+                <a:spcAft>
+                  <a:spcPct val="0"/>
+                </a:spcAft>
+                <a:buClrTx/>
+                <a:buSzTx/>
+                <a:buFontTx/>
+                <a:buNone/>
+                <a:tabLst/>
+              </a:pPr>
+              <a:r>
+                <a:rPr kumimoji="0" lang="en-US" altLang="ko-KR" sz="700" b="0" i="0" u="none" strike="noStrike" cap="none" normalizeH="0" baseline="0" dirty="0" err="1" smtClean="0">
+                  <a:ln>
+                    <a:noFill/>
+                  </a:ln>
+                  <a:effectLst/>
+                  <a:latin typeface="Arial" charset="0"/>
+                </a:rPr>
+                <a:t>Rel</a:t>
+              </a:r>
+              <a:endParaRPr kumimoji="0" lang="ko-KR" altLang="en-US" sz="700" b="0" i="0" u="none" strike="noStrike" cap="none" normalizeH="0" baseline="0" dirty="0" smtClean="0">
+                <a:ln>
+                  <a:noFill/>
+                </a:ln>
+                <a:effectLst/>
+                <a:latin typeface="Arial" charset="0"/>
+              </a:endParaRPr>
+            </a:p>
+          </p:txBody>
+        </p:sp>
+        <p:sp>
+          <p:nvSpPr>
+            <p:cNvPr id="88" name="직사각형 87"/>
+            <p:cNvSpPr/>
+            <p:nvPr/>
+          </p:nvSpPr>
+          <p:spPr bwMode="auto">
+            <a:xfrm>
+              <a:off x="1264489" y="2637139"/>
+              <a:ext cx="360040" cy="144016"/>
+            </a:xfrm>
+            <a:prstGeom prst="rect">
+              <a:avLst/>
+            </a:prstGeom>
+            <a:noFill/>
+            <a:ln w="9525" cap="flat" cmpd="sng" algn="ctr">
+              <a:solidFill>
+                <a:schemeClr val="tx1"/>
+              </a:solidFill>
+              <a:prstDash val="solid"/>
+              <a:round/>
+              <a:headEnd type="none" w="med" len="med"/>
+              <a:tailEnd type="none" w="med" len="med"/>
+            </a:ln>
+            <a:effectLst/>
+          </p:spPr>
+          <p:txBody>
+            <a:bodyPr vert="horz" wrap="square" lIns="91440" tIns="45720" rIns="91440" bIns="45720" numCol="1" rtlCol="0" anchor="ctr" anchorCtr="1" compatLnSpc="1">
+              <a:prstTxWarp prst="textNoShape">
+                <a:avLst/>
+              </a:prstTxWarp>
+            </a:bodyPr>
+            <a:lstStyle/>
+            <a:p>
+              <a:pPr marL="0" marR="0" indent="0" algn="ctr" defTabSz="914400" rtl="0" eaLnBrk="1" fontAlgn="base" latinLnBrk="0" hangingPunct="1">
+                <a:lnSpc>
+                  <a:spcPct val="100000"/>
+                </a:lnSpc>
+                <a:spcBef>
+                  <a:spcPct val="0"/>
+                </a:spcBef>
+                <a:spcAft>
+                  <a:spcPct val="0"/>
+                </a:spcAft>
+                <a:buClrTx/>
+                <a:buSzTx/>
+                <a:buFontTx/>
+                <a:buNone/>
+                <a:tabLst/>
+              </a:pPr>
+              <a:r>
+                <a:rPr kumimoji="0" lang="en-US" altLang="ko-KR" sz="700" b="0" i="0" u="none" strike="noStrike" cap="none" normalizeH="0" baseline="0" dirty="0" smtClean="0">
+                  <a:ln>
+                    <a:noFill/>
+                  </a:ln>
+                  <a:effectLst/>
+                  <a:latin typeface="Arial" charset="0"/>
+                </a:rPr>
+                <a:t>Lib</a:t>
+              </a:r>
+              <a:endParaRPr kumimoji="0" lang="ko-KR" altLang="en-US" sz="700" b="0" i="0" u="none" strike="noStrike" cap="none" normalizeH="0" baseline="0" dirty="0" smtClean="0">
+                <a:ln>
+                  <a:noFill/>
+                </a:ln>
+                <a:effectLst/>
+                <a:latin typeface="Arial" charset="0"/>
+              </a:endParaRPr>
+            </a:p>
+          </p:txBody>
+        </p:sp>
+        <p:sp>
+          <p:nvSpPr>
+            <p:cNvPr id="89" name="직사각형 88"/>
+            <p:cNvSpPr/>
+            <p:nvPr/>
+          </p:nvSpPr>
+          <p:spPr bwMode="auto">
+            <a:xfrm>
+              <a:off x="1984569" y="2637139"/>
+              <a:ext cx="360040" cy="144016"/>
+            </a:xfrm>
+            <a:prstGeom prst="rect">
+              <a:avLst/>
+            </a:prstGeom>
+            <a:noFill/>
+            <a:ln w="9525" cap="flat" cmpd="sng" algn="ctr">
+              <a:solidFill>
+                <a:schemeClr val="tx1"/>
+              </a:solidFill>
+              <a:prstDash val="solid"/>
+              <a:round/>
+              <a:headEnd type="none" w="med" len="med"/>
+              <a:tailEnd type="none" w="med" len="med"/>
+            </a:ln>
+            <a:effectLst/>
+          </p:spPr>
+          <p:txBody>
+            <a:bodyPr vert="horz" wrap="square" lIns="91440" tIns="45720" rIns="91440" bIns="45720" numCol="1" rtlCol="0" anchor="ctr" anchorCtr="1" compatLnSpc="1">
+              <a:prstTxWarp prst="textNoShape">
+                <a:avLst/>
+              </a:prstTxWarp>
+            </a:bodyPr>
+            <a:lstStyle/>
+            <a:p>
+              <a:pPr marL="0" marR="0" indent="0" algn="ctr" defTabSz="914400" rtl="0" eaLnBrk="1" fontAlgn="base" latinLnBrk="0" hangingPunct="1">
+                <a:lnSpc>
+                  <a:spcPct val="100000"/>
+                </a:lnSpc>
+                <a:spcBef>
+                  <a:spcPct val="0"/>
+                </a:spcBef>
+                <a:spcAft>
+                  <a:spcPct val="0"/>
+                </a:spcAft>
+                <a:buClrTx/>
+                <a:buSzTx/>
+                <a:buFontTx/>
+                <a:buNone/>
+                <a:tabLst/>
+              </a:pPr>
+              <a:r>
+                <a:rPr kumimoji="0" lang="en-US" altLang="ko-KR" sz="700" b="0" i="0" u="none" strike="noStrike" cap="none" normalizeH="0" baseline="0" dirty="0" err="1" smtClean="0">
+                  <a:ln>
+                    <a:noFill/>
+                  </a:ln>
+                  <a:effectLst/>
+                  <a:latin typeface="Arial" charset="0"/>
+                </a:rPr>
+                <a:t>Dbg</a:t>
+              </a:r>
+              <a:endParaRPr kumimoji="0" lang="ko-KR" altLang="en-US" sz="700" b="0" i="0" u="none" strike="noStrike" cap="none" normalizeH="0" baseline="0" dirty="0" smtClean="0">
+                <a:ln>
+                  <a:noFill/>
+                </a:ln>
                 <a:effectLst/>
                 <a:latin typeface="Arial" charset="0"/>
               </a:endParaRPr>
@@ -22273,9 +23795,9 @@
         <p:grpSpPr>
           <a:xfrm>
             <a:off x="611560" y="1340768"/>
-            <a:ext cx="1440160" cy="504282"/>
+            <a:ext cx="1440160" cy="500701"/>
             <a:chOff x="904449" y="4944523"/>
-            <a:chExt cx="1440160" cy="504282"/>
+            <a:chExt cx="1440160" cy="500701"/>
           </a:xfrm>
         </p:grpSpPr>
         <p:sp>
@@ -22438,7 +23960,7 @@
           </p:nvSpPr>
           <p:spPr bwMode="auto">
             <a:xfrm>
-              <a:off x="1624529" y="5301208"/>
+              <a:off x="1624529" y="5301095"/>
               <a:ext cx="360040" cy="144016"/>
             </a:xfrm>
             <a:prstGeom prst="rect">
@@ -22514,7 +24036,7 @@
           </p:nvSpPr>
           <p:spPr bwMode="auto">
             <a:xfrm>
-              <a:off x="1264489" y="5301208"/>
+              <a:off x="1264489" y="5301095"/>
               <a:ext cx="360040" cy="144016"/>
             </a:xfrm>
             <a:prstGeom prst="rect">
@@ -22590,8 +24112,8 @@
           </p:nvSpPr>
           <p:spPr bwMode="auto">
             <a:xfrm>
-              <a:off x="1984569" y="5297626"/>
-              <a:ext cx="360040" cy="151179"/>
+              <a:off x="1984569" y="5301095"/>
+              <a:ext cx="360040" cy="144015"/>
             </a:xfrm>
             <a:prstGeom prst="rect">
               <a:avLst/>
@@ -22668,9 +24190,9 @@
         <p:grpSpPr>
           <a:xfrm>
             <a:off x="2766943" y="1340768"/>
-            <a:ext cx="1440160" cy="504283"/>
+            <a:ext cx="1440160" cy="500701"/>
             <a:chOff x="3059832" y="4944523"/>
-            <a:chExt cx="1440160" cy="504283"/>
+            <a:chExt cx="1440160" cy="500701"/>
           </a:xfrm>
         </p:grpSpPr>
         <p:sp>
@@ -22752,7 +24274,7 @@
           <p:spPr bwMode="auto">
             <a:xfrm>
               <a:off x="3059832" y="5304677"/>
-              <a:ext cx="360040" cy="144016"/>
+              <a:ext cx="360040" cy="140433"/>
             </a:xfrm>
             <a:prstGeom prst="rect">
               <a:avLst/>
@@ -22828,7 +24350,7 @@
           <p:spPr bwMode="auto">
             <a:xfrm>
               <a:off x="3779912" y="5304790"/>
-              <a:ext cx="360040" cy="144016"/>
+              <a:ext cx="360040" cy="140320"/>
             </a:xfrm>
             <a:prstGeom prst="rect">
               <a:avLst/>
@@ -22903,8 +24425,8 @@
           </p:nvSpPr>
           <p:spPr bwMode="auto">
             <a:xfrm>
-              <a:off x="3419872" y="5304790"/>
-              <a:ext cx="360040" cy="144016"/>
+              <a:off x="3419872" y="5304791"/>
+              <a:ext cx="360040" cy="140320"/>
             </a:xfrm>
             <a:prstGeom prst="rect">
               <a:avLst/>
@@ -22979,8 +24501,8 @@
           </p:nvSpPr>
           <p:spPr bwMode="auto">
             <a:xfrm>
-              <a:off x="4139952" y="5301209"/>
-              <a:ext cx="360040" cy="144016"/>
+              <a:off x="4139952" y="5304790"/>
+              <a:ext cx="360040" cy="140320"/>
             </a:xfrm>
             <a:prstGeom prst="rect">
               <a:avLst/>
@@ -23057,9 +24579,9 @@
         <p:grpSpPr>
           <a:xfrm>
             <a:off x="611560" y="2273290"/>
-            <a:ext cx="1440160" cy="504283"/>
+            <a:ext cx="1440160" cy="500701"/>
             <a:chOff x="904449" y="5877045"/>
-            <a:chExt cx="1440160" cy="504283"/>
+            <a:chExt cx="1440160" cy="500701"/>
           </a:xfrm>
         </p:grpSpPr>
         <p:sp>
@@ -23147,7 +24669,7 @@
           <p:spPr bwMode="auto">
             <a:xfrm>
               <a:off x="904449" y="6237199"/>
-              <a:ext cx="360040" cy="144016"/>
+              <a:ext cx="360040" cy="140547"/>
             </a:xfrm>
             <a:prstGeom prst="rect">
               <a:avLst/>
@@ -23222,8 +24744,8 @@
           </p:nvSpPr>
           <p:spPr bwMode="auto">
             <a:xfrm>
-              <a:off x="1624529" y="6237312"/>
-              <a:ext cx="360040" cy="144016"/>
+              <a:off x="1624529" y="6237199"/>
+              <a:ext cx="360040" cy="140435"/>
             </a:xfrm>
             <a:prstGeom prst="rect">
               <a:avLst/>
@@ -23298,8 +24820,8 @@
           </p:nvSpPr>
           <p:spPr bwMode="auto">
             <a:xfrm>
-              <a:off x="1264489" y="6237312"/>
-              <a:ext cx="360040" cy="144016"/>
+              <a:off x="1264489" y="6237199"/>
+              <a:ext cx="360040" cy="140435"/>
             </a:xfrm>
             <a:prstGeom prst="rect">
               <a:avLst/>
@@ -23374,8 +24896,8 @@
           </p:nvSpPr>
           <p:spPr bwMode="auto">
             <a:xfrm>
-              <a:off x="1984569" y="6233731"/>
-              <a:ext cx="360040" cy="144016"/>
+              <a:off x="1984569" y="6237199"/>
+              <a:ext cx="360040" cy="140435"/>
             </a:xfrm>
             <a:prstGeom prst="rect">
               <a:avLst/>
@@ -23452,9 +24974,9 @@
         <p:grpSpPr>
           <a:xfrm>
             <a:off x="2766943" y="2273290"/>
-            <a:ext cx="1440160" cy="504283"/>
+            <a:ext cx="1440160" cy="500701"/>
             <a:chOff x="3059832" y="5877045"/>
-            <a:chExt cx="1440160" cy="504283"/>
+            <a:chExt cx="1440160" cy="500701"/>
           </a:xfrm>
         </p:grpSpPr>
         <p:sp>
@@ -23542,7 +25064,7 @@
           <p:spPr bwMode="auto">
             <a:xfrm>
               <a:off x="3059832" y="6237199"/>
-              <a:ext cx="360040" cy="144016"/>
+              <a:ext cx="360040" cy="140435"/>
             </a:xfrm>
             <a:prstGeom prst="rect">
               <a:avLst/>
@@ -23618,7 +25140,7 @@
           <p:spPr bwMode="auto">
             <a:xfrm>
               <a:off x="3779912" y="6237312"/>
-              <a:ext cx="360040" cy="144016"/>
+              <a:ext cx="360040" cy="140322"/>
             </a:xfrm>
             <a:prstGeom prst="rect">
               <a:avLst/>
@@ -23694,7 +25216,7 @@
           <p:spPr bwMode="auto">
             <a:xfrm>
               <a:off x="3419872" y="6237312"/>
-              <a:ext cx="360040" cy="144016"/>
+              <a:ext cx="360040" cy="140322"/>
             </a:xfrm>
             <a:prstGeom prst="rect">
               <a:avLst/>
@@ -23769,8 +25291,8 @@
           </p:nvSpPr>
           <p:spPr bwMode="auto">
             <a:xfrm>
-              <a:off x="4139952" y="6233731"/>
-              <a:ext cx="360040" cy="144016"/>
+              <a:off x="4139952" y="6237311"/>
+              <a:ext cx="360040" cy="140323"/>
             </a:xfrm>
             <a:prstGeom prst="rect">
               <a:avLst/>
@@ -23847,9 +25369,9 @@
         <p:grpSpPr>
           <a:xfrm>
             <a:off x="4922326" y="1340768"/>
-            <a:ext cx="1440160" cy="504282"/>
+            <a:ext cx="1440160" cy="500701"/>
             <a:chOff x="5215215" y="4944523"/>
-            <a:chExt cx="1440160" cy="504282"/>
+            <a:chExt cx="1440160" cy="500701"/>
           </a:xfrm>
         </p:grpSpPr>
         <p:sp>
@@ -24006,7 +25528,7 @@
           </p:nvSpPr>
           <p:spPr bwMode="auto">
             <a:xfrm>
-              <a:off x="5935295" y="5301208"/>
+              <a:off x="5935295" y="5301095"/>
               <a:ext cx="360040" cy="144016"/>
             </a:xfrm>
             <a:prstGeom prst="rect">
@@ -24082,7 +25604,7 @@
           </p:nvSpPr>
           <p:spPr bwMode="auto">
             <a:xfrm>
-              <a:off x="5575255" y="5301208"/>
+              <a:off x="5575255" y="5301095"/>
               <a:ext cx="360040" cy="144016"/>
             </a:xfrm>
             <a:prstGeom prst="rect">
@@ -24158,8 +25680,8 @@
           </p:nvSpPr>
           <p:spPr bwMode="auto">
             <a:xfrm>
-              <a:off x="6295335" y="5297626"/>
-              <a:ext cx="360040" cy="151179"/>
+              <a:off x="6295335" y="5301095"/>
+              <a:ext cx="360040" cy="144015"/>
             </a:xfrm>
             <a:prstGeom prst="rect">
               <a:avLst/>
@@ -27299,15 +28821,21 @@
             <a:p>
               <a:pPr algn="ctr"/>
               <a:r>
-                <a:rPr lang="en-US" altLang="ko-KR" dirty="0" smtClean="0"/>
+                <a:rPr lang="en-US" altLang="ko-KR" dirty="0" smtClean="0">
+                  <a:solidFill>
+                    <a:srgbClr val="0000FF"/>
+                  </a:solidFill>
+                </a:rPr>
                 <a:t>PCL</a:t>
               </a:r>
               <a:endParaRPr kumimoji="0" lang="ko-KR" altLang="en-US" sz="1800" b="0" i="0" u="none" strike="noStrike" cap="none" normalizeH="0" baseline="0" dirty="0" smtClean="0">
                 <a:ln>
                   <a:noFill/>
                 </a:ln>
+                <a:solidFill>
+                  <a:srgbClr val="0000FF"/>
+                </a:solidFill>
                 <a:effectLst/>
-                <a:latin typeface="Arial" charset="0"/>
               </a:endParaRPr>
             </a:p>
           </p:txBody>
@@ -27367,6 +28895,9 @@
                   <a:ln>
                     <a:noFill/>
                   </a:ln>
+                  <a:solidFill>
+                    <a:srgbClr val="0000FF"/>
+                  </a:solidFill>
                   <a:effectLst/>
                   <a:latin typeface="Arial" charset="0"/>
                 </a:rPr>
@@ -27376,6 +28907,9 @@
                 <a:ln>
                   <a:noFill/>
                 </a:ln>
+                <a:solidFill>
+                  <a:srgbClr val="0000FF"/>
+                </a:solidFill>
                 <a:effectLst/>
                 <a:latin typeface="Arial" charset="0"/>
               </a:endParaRPr>
@@ -27437,6 +28971,9 @@
                   <a:ln>
                     <a:noFill/>
                   </a:ln>
+                  <a:solidFill>
+                    <a:srgbClr val="0000FF"/>
+                  </a:solidFill>
                   <a:effectLst/>
                   <a:latin typeface="Arial" charset="0"/>
                 </a:rPr>
@@ -27446,6 +28983,9 @@
                 <a:ln>
                   <a:noFill/>
                 </a:ln>
+                <a:solidFill>
+                  <a:srgbClr val="0000FF"/>
+                </a:solidFill>
                 <a:effectLst/>
                 <a:latin typeface="Arial" charset="0"/>
               </a:endParaRPr>
@@ -27507,6 +29047,9 @@
                   <a:ln>
                     <a:noFill/>
                   </a:ln>
+                  <a:solidFill>
+                    <a:srgbClr val="0000FF"/>
+                  </a:solidFill>
                   <a:effectLst/>
                   <a:latin typeface="Arial" charset="0"/>
                 </a:rPr>
@@ -27516,6 +29059,9 @@
                 <a:ln>
                   <a:noFill/>
                 </a:ln>
+                <a:solidFill>
+                  <a:srgbClr val="0000FF"/>
+                </a:solidFill>
                 <a:effectLst/>
                 <a:latin typeface="Arial" charset="0"/>
               </a:endParaRPr>
@@ -27577,6 +29123,9 @@
                   <a:ln>
                     <a:noFill/>
                   </a:ln>
+                  <a:solidFill>
+                    <a:srgbClr val="0000FF"/>
+                  </a:solidFill>
                   <a:effectLst/>
                   <a:latin typeface="Arial" charset="0"/>
                 </a:rPr>
@@ -27586,6 +29135,9 @@
                 <a:ln>
                   <a:noFill/>
                 </a:ln>
+                <a:solidFill>
+                  <a:srgbClr val="0000FF"/>
+                </a:solidFill>
                 <a:effectLst/>
                 <a:latin typeface="Arial" charset="0"/>
               </a:endParaRPr>
@@ -27990,13 +29542,13 @@
       </p:grpSp>
       <p:grpSp>
         <p:nvGrpSpPr>
-          <p:cNvPr id="74" name="그룹 73"/>
+          <p:cNvPr id="69" name="그룹 68"/>
           <p:cNvGrpSpPr/>
           <p:nvPr/>
         </p:nvGrpSpPr>
         <p:grpSpPr>
           <a:xfrm>
-            <a:off x="2766943" y="5877272"/>
+            <a:off x="4927183" y="5877272"/>
             <a:ext cx="1440160" cy="515372"/>
             <a:chOff x="904449" y="1190877"/>
             <a:chExt cx="1440160" cy="515372"/>
@@ -28004,7 +29556,7 @@
         </p:grpSpPr>
         <p:sp>
           <p:nvSpPr>
-            <p:cNvPr id="75" name="직사각형 74"/>
+            <p:cNvPr id="70" name="직사각형 69"/>
             <p:cNvSpPr/>
             <p:nvPr/>
           </p:nvSpPr>
@@ -28059,7 +29611,7 @@
         </p:sp>
         <p:sp>
           <p:nvSpPr>
-            <p:cNvPr id="76" name="직사각형 75"/>
+            <p:cNvPr id="71" name="직사각형 70"/>
             <p:cNvSpPr/>
             <p:nvPr/>
           </p:nvSpPr>
@@ -28135,13 +29687,311 @@
         </p:sp>
         <p:sp>
           <p:nvSpPr>
+            <p:cNvPr id="72" name="직사각형 71"/>
+            <p:cNvSpPr/>
+            <p:nvPr/>
+          </p:nvSpPr>
+          <p:spPr bwMode="auto">
+            <a:xfrm>
+              <a:off x="1624529" y="1562233"/>
+              <a:ext cx="360040" cy="144016"/>
+            </a:xfrm>
+            <a:prstGeom prst="rect">
+              <a:avLst/>
+            </a:prstGeom>
+            <a:noFill/>
+            <a:ln w="9525" cap="flat" cmpd="sng" algn="ctr">
+              <a:solidFill>
+                <a:schemeClr val="tx1"/>
+              </a:solidFill>
+              <a:prstDash val="solid"/>
+              <a:round/>
+              <a:headEnd type="none" w="med" len="med"/>
+              <a:tailEnd type="none" w="med" len="med"/>
+            </a:ln>
+            <a:effectLst/>
+          </p:spPr>
+          <p:txBody>
+            <a:bodyPr vert="horz" wrap="square" lIns="91440" tIns="45720" rIns="91440" bIns="45720" numCol="1" rtlCol="0" anchor="ctr" anchorCtr="1" compatLnSpc="1">
+              <a:prstTxWarp prst="textNoShape">
+                <a:avLst/>
+              </a:prstTxWarp>
+            </a:bodyPr>
+            <a:lstStyle/>
+            <a:p>
+              <a:pPr marL="0" marR="0" indent="0" algn="ctr" defTabSz="914400" rtl="0" eaLnBrk="1" fontAlgn="base" latinLnBrk="0" hangingPunct="1">
+                <a:lnSpc>
+                  <a:spcPct val="100000"/>
+                </a:lnSpc>
+                <a:spcBef>
+                  <a:spcPct val="0"/>
+                </a:spcBef>
+                <a:spcAft>
+                  <a:spcPct val="0"/>
+                </a:spcAft>
+                <a:buClrTx/>
+                <a:buSzTx/>
+                <a:buFontTx/>
+                <a:buNone/>
+                <a:tabLst/>
+              </a:pPr>
+              <a:r>
+                <a:rPr kumimoji="0" lang="en-US" altLang="ko-KR" sz="700" b="0" i="0" u="none" strike="noStrike" cap="none" normalizeH="0" baseline="0" dirty="0" err="1" smtClean="0">
+                  <a:ln>
+                    <a:noFill/>
+                  </a:ln>
+                  <a:solidFill>
+                    <a:srgbClr val="0000FF"/>
+                  </a:solidFill>
+                  <a:effectLst/>
+                  <a:latin typeface="Arial" charset="0"/>
+                </a:rPr>
+                <a:t>Rel</a:t>
+              </a:r>
+              <a:endParaRPr kumimoji="0" lang="ko-KR" altLang="en-US" sz="700" b="0" i="0" u="none" strike="noStrike" cap="none" normalizeH="0" baseline="0" dirty="0" smtClean="0">
+                <a:ln>
+                  <a:noFill/>
+                </a:ln>
+                <a:solidFill>
+                  <a:srgbClr val="0000FF"/>
+                </a:solidFill>
+                <a:effectLst/>
+                <a:latin typeface="Arial" charset="0"/>
+              </a:endParaRPr>
+            </a:p>
+          </p:txBody>
+        </p:sp>
+        <p:sp>
+          <p:nvSpPr>
+            <p:cNvPr id="73" name="직사각형 72"/>
+            <p:cNvSpPr/>
+            <p:nvPr/>
+          </p:nvSpPr>
+          <p:spPr bwMode="auto">
+            <a:xfrm>
+              <a:off x="1264489" y="1562233"/>
+              <a:ext cx="360040" cy="144016"/>
+            </a:xfrm>
+            <a:prstGeom prst="rect">
+              <a:avLst/>
+            </a:prstGeom>
+            <a:noFill/>
+            <a:ln w="9525" cap="flat" cmpd="sng" algn="ctr">
+              <a:solidFill>
+                <a:schemeClr val="tx1"/>
+              </a:solidFill>
+              <a:prstDash val="solid"/>
+              <a:round/>
+              <a:headEnd type="none" w="med" len="med"/>
+              <a:tailEnd type="none" w="med" len="med"/>
+            </a:ln>
+            <a:effectLst/>
+          </p:spPr>
+          <p:txBody>
+            <a:bodyPr vert="horz" wrap="square" lIns="91440" tIns="45720" rIns="91440" bIns="45720" numCol="1" rtlCol="0" anchor="ctr" anchorCtr="1" compatLnSpc="1">
+              <a:prstTxWarp prst="textNoShape">
+                <a:avLst/>
+              </a:prstTxWarp>
+            </a:bodyPr>
+            <a:lstStyle/>
+            <a:p>
+              <a:pPr marL="0" marR="0" indent="0" algn="ctr" defTabSz="914400" rtl="0" eaLnBrk="1" fontAlgn="base" latinLnBrk="0" hangingPunct="1">
+                <a:lnSpc>
+                  <a:spcPct val="100000"/>
+                </a:lnSpc>
+                <a:spcBef>
+                  <a:spcPct val="0"/>
+                </a:spcBef>
+                <a:spcAft>
+                  <a:spcPct val="0"/>
+                </a:spcAft>
+                <a:buClrTx/>
+                <a:buSzTx/>
+                <a:buFontTx/>
+                <a:buNone/>
+                <a:tabLst/>
+              </a:pPr>
+              <a:r>
+                <a:rPr kumimoji="0" lang="en-US" altLang="ko-KR" sz="700" b="0" i="0" u="none" strike="noStrike" cap="none" normalizeH="0" baseline="0" dirty="0" smtClean="0">
+                  <a:ln>
+                    <a:noFill/>
+                  </a:ln>
+                  <a:solidFill>
+                    <a:srgbClr val="0000FF"/>
+                  </a:solidFill>
+                  <a:effectLst/>
+                  <a:latin typeface="Arial" charset="0"/>
+                </a:rPr>
+                <a:t>Lib</a:t>
+              </a:r>
+              <a:endParaRPr kumimoji="0" lang="ko-KR" altLang="en-US" sz="700" b="0" i="0" u="none" strike="noStrike" cap="none" normalizeH="0" baseline="0" dirty="0" smtClean="0">
+                <a:ln>
+                  <a:noFill/>
+                </a:ln>
+                <a:solidFill>
+                  <a:srgbClr val="0000FF"/>
+                </a:solidFill>
+                <a:effectLst/>
+                <a:latin typeface="Arial" charset="0"/>
+              </a:endParaRPr>
+            </a:p>
+          </p:txBody>
+        </p:sp>
+        <p:sp>
+          <p:nvSpPr>
+            <p:cNvPr id="80" name="직사각형 79"/>
+            <p:cNvSpPr/>
+            <p:nvPr/>
+          </p:nvSpPr>
+          <p:spPr bwMode="auto">
+            <a:xfrm>
+              <a:off x="1984569" y="1562006"/>
+              <a:ext cx="360040" cy="144016"/>
+            </a:xfrm>
+            <a:prstGeom prst="rect">
+              <a:avLst/>
+            </a:prstGeom>
+            <a:noFill/>
+            <a:ln w="9525" cap="flat" cmpd="sng" algn="ctr">
+              <a:solidFill>
+                <a:schemeClr val="tx1"/>
+              </a:solidFill>
+              <a:prstDash val="solid"/>
+              <a:round/>
+              <a:headEnd type="none" w="med" len="med"/>
+              <a:tailEnd type="none" w="med" len="med"/>
+            </a:ln>
+            <a:effectLst/>
+          </p:spPr>
+          <p:txBody>
+            <a:bodyPr vert="horz" wrap="square" lIns="91440" tIns="45720" rIns="91440" bIns="45720" numCol="1" rtlCol="0" anchor="ctr" anchorCtr="1" compatLnSpc="1">
+              <a:prstTxWarp prst="textNoShape">
+                <a:avLst/>
+              </a:prstTxWarp>
+            </a:bodyPr>
+            <a:lstStyle/>
+            <a:p>
+              <a:pPr marL="0" marR="0" indent="0" algn="ctr" defTabSz="914400" rtl="0" eaLnBrk="1" fontAlgn="base" latinLnBrk="0" hangingPunct="1">
+                <a:lnSpc>
+                  <a:spcPct val="100000"/>
+                </a:lnSpc>
+                <a:spcBef>
+                  <a:spcPct val="0"/>
+                </a:spcBef>
+                <a:spcAft>
+                  <a:spcPct val="0"/>
+                </a:spcAft>
+                <a:buClrTx/>
+                <a:buSzTx/>
+                <a:buFontTx/>
+                <a:buNone/>
+                <a:tabLst/>
+              </a:pPr>
+              <a:r>
+                <a:rPr kumimoji="0" lang="en-US" altLang="ko-KR" sz="700" b="0" i="0" u="none" strike="noStrike" cap="none" normalizeH="0" baseline="0" dirty="0" err="1" smtClean="0">
+                  <a:ln>
+                    <a:noFill/>
+                  </a:ln>
+                  <a:solidFill>
+                    <a:srgbClr val="0000FF"/>
+                  </a:solidFill>
+                  <a:effectLst/>
+                  <a:latin typeface="Arial" charset="0"/>
+                </a:rPr>
+                <a:t>Dbg</a:t>
+              </a:r>
+              <a:endParaRPr kumimoji="0" lang="ko-KR" altLang="en-US" sz="700" b="0" i="0" u="none" strike="noStrike" cap="none" normalizeH="0" baseline="0" dirty="0" smtClean="0">
+                <a:ln>
+                  <a:noFill/>
+                </a:ln>
+                <a:solidFill>
+                  <a:srgbClr val="0000FF"/>
+                </a:solidFill>
+                <a:effectLst/>
+                <a:latin typeface="Arial" charset="0"/>
+              </a:endParaRPr>
+            </a:p>
+          </p:txBody>
+        </p:sp>
+      </p:grpSp>
+      <p:grpSp>
+        <p:nvGrpSpPr>
+          <p:cNvPr id="5" name="그룹 4"/>
+          <p:cNvGrpSpPr/>
+          <p:nvPr/>
+        </p:nvGrpSpPr>
+        <p:grpSpPr>
+          <a:xfrm>
+            <a:off x="2766943" y="5877272"/>
+            <a:ext cx="1440160" cy="515372"/>
+            <a:chOff x="2766943" y="5877272"/>
+            <a:chExt cx="1440160" cy="515372"/>
+          </a:xfrm>
+        </p:grpSpPr>
+        <p:sp>
+          <p:nvSpPr>
+            <p:cNvPr id="75" name="직사각형 74"/>
+            <p:cNvSpPr/>
+            <p:nvPr/>
+          </p:nvSpPr>
+          <p:spPr bwMode="auto">
+            <a:xfrm>
+              <a:off x="2766943" y="5877272"/>
+              <a:ext cx="1440160" cy="509931"/>
+            </a:xfrm>
+            <a:prstGeom prst="rect">
+              <a:avLst/>
+            </a:prstGeom>
+            <a:noFill/>
+            <a:ln w="9525" cap="flat" cmpd="sng" algn="ctr">
+              <a:solidFill>
+                <a:schemeClr val="tx1"/>
+              </a:solidFill>
+              <a:prstDash val="solid"/>
+              <a:round/>
+              <a:headEnd type="none" w="med" len="med"/>
+              <a:tailEnd type="none" w="med" len="med"/>
+            </a:ln>
+            <a:effectLst/>
+          </p:spPr>
+          <p:txBody>
+            <a:bodyPr vert="horz" wrap="square" lIns="91440" tIns="45720" rIns="91440" bIns="45720" numCol="1" rtlCol="0" anchor="t" anchorCtr="1" compatLnSpc="1">
+              <a:prstTxWarp prst="textNoShape">
+                <a:avLst/>
+              </a:prstTxWarp>
+            </a:bodyPr>
+            <a:lstStyle/>
+            <a:p>
+              <a:pPr algn="ctr"/>
+              <a:r>
+                <a:rPr lang="en-US" altLang="ko-KR" dirty="0" err="1" smtClean="0">
+                  <a:solidFill>
+                    <a:srgbClr val="0000FF"/>
+                  </a:solidFill>
+                </a:rPr>
+                <a:t>VxL</a:t>
+              </a:r>
+              <a:endParaRPr kumimoji="0" lang="ko-KR" altLang="en-US" sz="1800" b="0" i="0" u="none" strike="noStrike" cap="none" normalizeH="0" baseline="0" dirty="0" smtClean="0">
+                <a:ln>
+                  <a:noFill/>
+                </a:ln>
+                <a:solidFill>
+                  <a:srgbClr val="0000FF"/>
+                </a:solidFill>
+                <a:effectLst/>
+              </a:endParaRPr>
+            </a:p>
+          </p:txBody>
+        </p:sp>
+        <p:sp>
+          <p:nvSpPr>
             <p:cNvPr id="77" name="직사각형 76"/>
             <p:cNvSpPr/>
             <p:nvPr/>
           </p:nvSpPr>
           <p:spPr bwMode="auto">
             <a:xfrm>
-              <a:off x="1624529" y="1562233"/>
+              <a:off x="3487023" y="6248628"/>
               <a:ext cx="360040" cy="144016"/>
             </a:xfrm>
             <a:prstGeom prst="rect">
@@ -28217,7 +30067,7 @@
           </p:nvSpPr>
           <p:spPr bwMode="auto">
             <a:xfrm>
-              <a:off x="1264489" y="1562233"/>
+              <a:off x="3126983" y="6248628"/>
               <a:ext cx="360040" cy="144016"/>
             </a:xfrm>
             <a:prstGeom prst="rect">
@@ -28293,7 +30143,7 @@
           </p:nvSpPr>
           <p:spPr bwMode="auto">
             <a:xfrm>
-              <a:off x="1984569" y="1562006"/>
+              <a:off x="3847063" y="6248401"/>
               <a:ext cx="360040" cy="144016"/>
             </a:xfrm>
             <a:prstGeom prst="rect">
@@ -28354,6 +30204,86 @@
                 </a:ln>
                 <a:solidFill>
                   <a:srgbClr val="0000FF"/>
+                </a:solidFill>
+                <a:effectLst/>
+                <a:latin typeface="Arial" charset="0"/>
+              </a:endParaRPr>
+            </a:p>
+          </p:txBody>
+        </p:sp>
+        <p:sp>
+          <p:nvSpPr>
+            <p:cNvPr id="81" name="직사각형 80"/>
+            <p:cNvSpPr/>
+            <p:nvPr/>
+          </p:nvSpPr>
+          <p:spPr bwMode="auto">
+            <a:xfrm>
+              <a:off x="2766943" y="6248628"/>
+              <a:ext cx="360040" cy="144016"/>
+            </a:xfrm>
+            <a:prstGeom prst="rect">
+              <a:avLst/>
+            </a:prstGeom>
+            <a:noFill/>
+            <a:ln w="9525" cap="flat" cmpd="sng" algn="ctr">
+              <a:solidFill>
+                <a:schemeClr val="tx1"/>
+              </a:solidFill>
+              <a:prstDash val="solid"/>
+              <a:round/>
+              <a:headEnd type="none" w="med" len="med"/>
+              <a:tailEnd type="none" w="med" len="med"/>
+            </a:ln>
+            <a:effectLst/>
+          </p:spPr>
+          <p:txBody>
+            <a:bodyPr vert="horz" wrap="square" lIns="91440" tIns="45720" rIns="91440" bIns="45720" numCol="1" rtlCol="0" anchor="ctr" anchorCtr="1" compatLnSpc="1">
+              <a:prstTxWarp prst="textNoShape">
+                <a:avLst/>
+              </a:prstTxWarp>
+            </a:bodyPr>
+            <a:lstStyle/>
+            <a:p>
+              <a:pPr marL="0" marR="0" indent="0" algn="ctr" defTabSz="914400" rtl="0" eaLnBrk="1" fontAlgn="base" latinLnBrk="0" hangingPunct="1">
+                <a:lnSpc>
+                  <a:spcPct val="100000"/>
+                </a:lnSpc>
+                <a:spcBef>
+                  <a:spcPct val="0"/>
+                </a:spcBef>
+                <a:spcAft>
+                  <a:spcPct val="0"/>
+                </a:spcAft>
+                <a:buClrTx/>
+                <a:buSzTx/>
+                <a:buFontTx/>
+                <a:buNone/>
+                <a:tabLst/>
+              </a:pPr>
+              <a:r>
+                <a:rPr kumimoji="0" lang="en-US" altLang="ko-KR" sz="700" b="0" i="0" u="none" strike="noStrike" cap="none" normalizeH="0" baseline="0" dirty="0" smtClean="0">
+                  <a:ln>
+                    <a:noFill/>
+                  </a:ln>
+                  <a:solidFill>
+                    <a:schemeClr val="bg1">
+                      <a:lumMod val="85000"/>
+                    </a:schemeClr>
+                  </a:solidFill>
+                  <a:effectLst/>
+                  <a:latin typeface="Arial" charset="0"/>
+                </a:rPr>
+                <a:t>SO</a:t>
+              </a:r>
+              <a:endParaRPr kumimoji="0" lang="ko-KR" altLang="en-US" sz="700" b="0" i="0" u="none" strike="noStrike" cap="none" normalizeH="0" baseline="0" dirty="0" smtClean="0">
+                <a:ln>
+                  <a:noFill/>
+                </a:ln>
+                <a:solidFill>
+                  <a:schemeClr val="bg1">
+                    <a:lumMod val="85000"/>
+                  </a:schemeClr>
                 </a:solidFill>
                 <a:effectLst/>
                 <a:latin typeface="Arial" charset="0"/>

</xml_diff>